<commit_message>
Updated excel and presentations files to reflect latest test runs
</commit_message>
<xml_diff>
--- a/Project Presentation.pptx
+++ b/Project Presentation.pptx
@@ -1053,28 +1053,28 @@
                 <c:formatCode>General</c:formatCode>
                 <c:ptCount val="8"/>
                 <c:pt idx="0">
-                  <c:v>1240</c:v>
+                  <c:v>180</c:v>
                 </c:pt>
                 <c:pt idx="1">
-                  <c:v>1373</c:v>
+                  <c:v>192</c:v>
                 </c:pt>
                 <c:pt idx="2">
-                  <c:v>1447</c:v>
+                  <c:v>288</c:v>
                 </c:pt>
                 <c:pt idx="3">
-                  <c:v>1471</c:v>
+                  <c:v>407</c:v>
                 </c:pt>
                 <c:pt idx="4">
-                  <c:v>1841</c:v>
+                  <c:v>528</c:v>
                 </c:pt>
                 <c:pt idx="5">
-                  <c:v>2234</c:v>
+                  <c:v>754</c:v>
                 </c:pt>
                 <c:pt idx="6">
-                  <c:v>2752</c:v>
+                  <c:v>911</c:v>
                 </c:pt>
                 <c:pt idx="7">
-                  <c:v>3010</c:v>
+                  <c:v>1036</c:v>
                 </c:pt>
               </c:numCache>
             </c:numRef>
@@ -1595,28 +1595,28 @@
                 <c:formatCode>General</c:formatCode>
                 <c:ptCount val="8"/>
                 <c:pt idx="0">
-                  <c:v>1240</c:v>
+                  <c:v>180</c:v>
                 </c:pt>
                 <c:pt idx="1">
-                  <c:v>1373</c:v>
+                  <c:v>192</c:v>
                 </c:pt>
                 <c:pt idx="2">
-                  <c:v>1447</c:v>
+                  <c:v>288</c:v>
                 </c:pt>
                 <c:pt idx="3">
-                  <c:v>1471</c:v>
+                  <c:v>407</c:v>
                 </c:pt>
                 <c:pt idx="4">
-                  <c:v>1841</c:v>
+                  <c:v>528</c:v>
                 </c:pt>
                 <c:pt idx="5">
-                  <c:v>2234</c:v>
+                  <c:v>754</c:v>
                 </c:pt>
                 <c:pt idx="6">
-                  <c:v>2752</c:v>
+                  <c:v>911</c:v>
                 </c:pt>
                 <c:pt idx="7">
-                  <c:v>3010</c:v>
+                  <c:v>1036</c:v>
                 </c:pt>
               </c:numCache>
             </c:numRef>
@@ -1691,25 +1691,25 @@
                 <c:formatCode>General</c:formatCode>
                 <c:ptCount val="8"/>
                 <c:pt idx="0">
-                  <c:v>147.63999999999999</c:v>
+                  <c:v>140</c:v>
                 </c:pt>
                 <c:pt idx="1">
-                  <c:v>203.4</c:v>
+                  <c:v>189</c:v>
                 </c:pt>
                 <c:pt idx="2">
-                  <c:v>295.83</c:v>
+                  <c:v>279</c:v>
                 </c:pt>
                 <c:pt idx="3">
-                  <c:v>401.13</c:v>
+                  <c:v>394</c:v>
                 </c:pt>
                 <c:pt idx="4">
-                  <c:v>535.76</c:v>
+                  <c:v>527</c:v>
                 </c:pt>
                 <c:pt idx="5">
-                  <c:v>713.55</c:v>
+                  <c:v>689</c:v>
                 </c:pt>
                 <c:pt idx="6">
-                  <c:v>890.52</c:v>
+                  <c:v>904</c:v>
                 </c:pt>
                 <c:pt idx="7">
                   <c:v>1121</c:v>
@@ -3713,7 +3713,7 @@
           <a:noFill/>
           <a:extLst>
             <a:ext uri="{909E8E84-426E-40dd-AFC4-6F175D3DCCD1}">
-              <a14:hiddenFill xmlns="" xmlns:a14="http://schemas.microsoft.com/office/drawing/2010/main">
+              <a14:hiddenFill xmlns:a14="http://schemas.microsoft.com/office/drawing/2010/main" xmlns="">
                 <a:solidFill>
                   <a:srgbClr val="FFFFFF"/>
                 </a:solidFill>
@@ -3772,7 +3772,7 @@
             </a:ln>
             <a:extLst>
               <a:ext uri="{91240B29-F687-4f45-9708-019B960494DF}">
-                <a14:hiddenLine xmlns="" xmlns:a14="http://schemas.microsoft.com/office/drawing/2010/main" w="9525">
+                <a14:hiddenLine xmlns:a14="http://schemas.microsoft.com/office/drawing/2010/main" xmlns="" w="9525">
                   <a:solidFill>
                     <a:srgbClr val="000000"/>
                   </a:solidFill>
@@ -3862,7 +3862,7 @@
             </a:ln>
             <a:extLst>
               <a:ext uri="{91240B29-F687-4f45-9708-019B960494DF}">
-                <a14:hiddenLine xmlns="" xmlns:a14="http://schemas.microsoft.com/office/drawing/2010/main" w="9525">
+                <a14:hiddenLine xmlns:a14="http://schemas.microsoft.com/office/drawing/2010/main" xmlns="" w="9525">
                   <a:solidFill>
                     <a:srgbClr val="000000"/>
                   </a:solidFill>
@@ -3952,7 +3952,7 @@
             </a:ln>
             <a:extLst>
               <a:ext uri="{91240B29-F687-4f45-9708-019B960494DF}">
-                <a14:hiddenLine xmlns="" xmlns:a14="http://schemas.microsoft.com/office/drawing/2010/main" w="9525">
+                <a14:hiddenLine xmlns:a14="http://schemas.microsoft.com/office/drawing/2010/main" xmlns="" w="9525">
                   <a:solidFill>
                     <a:srgbClr val="000000"/>
                   </a:solidFill>
@@ -3986,7 +3986,7 @@
             </a:ln>
             <a:extLst>
               <a:ext uri="{91240B29-F687-4f45-9708-019B960494DF}">
-                <a14:hiddenLine xmlns="" xmlns:a14="http://schemas.microsoft.com/office/drawing/2010/main" w="9525">
+                <a14:hiddenLine xmlns:a14="http://schemas.microsoft.com/office/drawing/2010/main" xmlns="" w="9525">
                   <a:solidFill>
                     <a:srgbClr val="000000"/>
                   </a:solidFill>
@@ -4076,7 +4076,7 @@
             </a:ln>
             <a:extLst>
               <a:ext uri="{91240B29-F687-4f45-9708-019B960494DF}">
-                <a14:hiddenLine xmlns="" xmlns:a14="http://schemas.microsoft.com/office/drawing/2010/main" w="9525">
+                <a14:hiddenLine xmlns:a14="http://schemas.microsoft.com/office/drawing/2010/main" xmlns="" w="9525">
                   <a:solidFill>
                     <a:srgbClr val="000000"/>
                   </a:solidFill>
@@ -4138,7 +4138,7 @@
             </a:ln>
             <a:extLst>
               <a:ext uri="{91240B29-F687-4f45-9708-019B960494DF}">
-                <a14:hiddenLine xmlns="" xmlns:a14="http://schemas.microsoft.com/office/drawing/2010/main" w="9525">
+                <a14:hiddenLine xmlns:a14="http://schemas.microsoft.com/office/drawing/2010/main" xmlns="" w="9525">
                   <a:solidFill>
                     <a:srgbClr val="000000"/>
                   </a:solidFill>
@@ -4200,7 +4200,7 @@
             </a:ln>
             <a:extLst>
               <a:ext uri="{91240B29-F687-4f45-9708-019B960494DF}">
-                <a14:hiddenLine xmlns="" xmlns:a14="http://schemas.microsoft.com/office/drawing/2010/main" w="9525">
+                <a14:hiddenLine xmlns:a14="http://schemas.microsoft.com/office/drawing/2010/main" xmlns="" w="9525">
                   <a:solidFill>
                     <a:srgbClr val="000000"/>
                   </a:solidFill>
@@ -4290,7 +4290,7 @@
             </a:ln>
             <a:extLst>
               <a:ext uri="{91240B29-F687-4f45-9708-019B960494DF}">
-                <a14:hiddenLine xmlns="" xmlns:a14="http://schemas.microsoft.com/office/drawing/2010/main" w="9525">
+                <a14:hiddenLine xmlns:a14="http://schemas.microsoft.com/office/drawing/2010/main" xmlns="" w="9525">
                   <a:solidFill>
                     <a:srgbClr val="000000"/>
                   </a:solidFill>
@@ -4352,7 +4352,7 @@
             </a:ln>
             <a:extLst>
               <a:ext uri="{91240B29-F687-4f45-9708-019B960494DF}">
-                <a14:hiddenLine xmlns="" xmlns:a14="http://schemas.microsoft.com/office/drawing/2010/main" w="9525">
+                <a14:hiddenLine xmlns:a14="http://schemas.microsoft.com/office/drawing/2010/main" xmlns="" w="9525">
                   <a:solidFill>
                     <a:srgbClr val="000000"/>
                   </a:solidFill>
@@ -4414,7 +4414,7 @@
             </a:ln>
             <a:extLst>
               <a:ext uri="{91240B29-F687-4f45-9708-019B960494DF}">
-                <a14:hiddenLine xmlns="" xmlns:a14="http://schemas.microsoft.com/office/drawing/2010/main" w="9525">
+                <a14:hiddenLine xmlns:a14="http://schemas.microsoft.com/office/drawing/2010/main" xmlns="" w="9525">
                   <a:solidFill>
                     <a:srgbClr val="000000"/>
                   </a:solidFill>
@@ -4504,7 +4504,7 @@
             </a:ln>
             <a:extLst>
               <a:ext uri="{91240B29-F687-4f45-9708-019B960494DF}">
-                <a14:hiddenLine xmlns="" xmlns:a14="http://schemas.microsoft.com/office/drawing/2010/main" w="9525">
+                <a14:hiddenLine xmlns:a14="http://schemas.microsoft.com/office/drawing/2010/main" xmlns="" w="9525">
                   <a:solidFill>
                     <a:srgbClr val="000000"/>
                   </a:solidFill>
@@ -4594,7 +4594,7 @@
             </a:ln>
             <a:extLst>
               <a:ext uri="{91240B29-F687-4f45-9708-019B960494DF}">
-                <a14:hiddenLine xmlns="" xmlns:a14="http://schemas.microsoft.com/office/drawing/2010/main" w="9525">
+                <a14:hiddenLine xmlns:a14="http://schemas.microsoft.com/office/drawing/2010/main" xmlns="" w="9525">
                   <a:solidFill>
                     <a:srgbClr val="000000"/>
                   </a:solidFill>
@@ -4656,7 +4656,7 @@
             </a:ln>
             <a:extLst>
               <a:ext uri="{91240B29-F687-4f45-9708-019B960494DF}">
-                <a14:hiddenLine xmlns="" xmlns:a14="http://schemas.microsoft.com/office/drawing/2010/main" w="9525">
+                <a14:hiddenLine xmlns:a14="http://schemas.microsoft.com/office/drawing/2010/main" xmlns="" w="9525">
                   <a:solidFill>
                     <a:srgbClr val="000000"/>
                   </a:solidFill>
@@ -4766,7 +4766,7 @@
             </a:ln>
             <a:extLst>
               <a:ext uri="{91240B29-F687-4f45-9708-019B960494DF}">
-                <a14:hiddenLine xmlns="" xmlns:a14="http://schemas.microsoft.com/office/drawing/2010/main" w="9525">
+                <a14:hiddenLine xmlns:a14="http://schemas.microsoft.com/office/drawing/2010/main" xmlns="" w="9525">
                   <a:solidFill>
                     <a:srgbClr val="000000"/>
                   </a:solidFill>
@@ -4828,7 +4828,7 @@
             </a:ln>
             <a:extLst>
               <a:ext uri="{91240B29-F687-4f45-9708-019B960494DF}">
-                <a14:hiddenLine xmlns="" xmlns:a14="http://schemas.microsoft.com/office/drawing/2010/main" w="9525">
+                <a14:hiddenLine xmlns:a14="http://schemas.microsoft.com/office/drawing/2010/main" xmlns="" w="9525">
                   <a:solidFill>
                     <a:srgbClr val="000000"/>
                   </a:solidFill>
@@ -4918,7 +4918,7 @@
             </a:ln>
             <a:extLst>
               <a:ext uri="{91240B29-F687-4f45-9708-019B960494DF}">
-                <a14:hiddenLine xmlns="" xmlns:a14="http://schemas.microsoft.com/office/drawing/2010/main" w="9525">
+                <a14:hiddenLine xmlns:a14="http://schemas.microsoft.com/office/drawing/2010/main" xmlns="" w="9525">
                   <a:solidFill>
                     <a:srgbClr val="000000"/>
                   </a:solidFill>
@@ -5008,7 +5008,7 @@
             </a:ln>
             <a:extLst>
               <a:ext uri="{91240B29-F687-4f45-9708-019B960494DF}">
-                <a14:hiddenLine xmlns="" xmlns:a14="http://schemas.microsoft.com/office/drawing/2010/main" w="9525">
+                <a14:hiddenLine xmlns:a14="http://schemas.microsoft.com/office/drawing/2010/main" xmlns="" w="9525">
                   <a:solidFill>
                     <a:srgbClr val="000000"/>
                   </a:solidFill>
@@ -5070,7 +5070,7 @@
             </a:ln>
             <a:extLst>
               <a:ext uri="{91240B29-F687-4f45-9708-019B960494DF}">
-                <a14:hiddenLine xmlns="" xmlns:a14="http://schemas.microsoft.com/office/drawing/2010/main" w="9525">
+                <a14:hiddenLine xmlns:a14="http://schemas.microsoft.com/office/drawing/2010/main" xmlns="" w="9525">
                   <a:solidFill>
                     <a:srgbClr val="000000"/>
                   </a:solidFill>
@@ -5160,7 +5160,7 @@
             </a:ln>
             <a:extLst>
               <a:ext uri="{91240B29-F687-4f45-9708-019B960494DF}">
-                <a14:hiddenLine xmlns="" xmlns:a14="http://schemas.microsoft.com/office/drawing/2010/main" w="9525">
+                <a14:hiddenLine xmlns:a14="http://schemas.microsoft.com/office/drawing/2010/main" xmlns="" w="9525">
                   <a:solidFill>
                     <a:srgbClr val="000000"/>
                   </a:solidFill>
@@ -5250,7 +5250,7 @@
             </a:ln>
             <a:extLst>
               <a:ext uri="{91240B29-F687-4f45-9708-019B960494DF}">
-                <a14:hiddenLine xmlns="" xmlns:a14="http://schemas.microsoft.com/office/drawing/2010/main" w="9525">
+                <a14:hiddenLine xmlns:a14="http://schemas.microsoft.com/office/drawing/2010/main" xmlns="" w="9525">
                   <a:solidFill>
                     <a:srgbClr val="000000"/>
                   </a:solidFill>
@@ -5306,7 +5306,7 @@
             </a:ln>
             <a:extLst>
               <a:ext uri="{91240B29-F687-4f45-9708-019B960494DF}">
-                <a14:hiddenLine xmlns="" xmlns:a14="http://schemas.microsoft.com/office/drawing/2010/main" w="9525">
+                <a14:hiddenLine xmlns:a14="http://schemas.microsoft.com/office/drawing/2010/main" xmlns="" w="9525">
                   <a:solidFill>
                     <a:srgbClr val="000000"/>
                   </a:solidFill>
@@ -5396,7 +5396,7 @@
             </a:ln>
             <a:extLst>
               <a:ext uri="{91240B29-F687-4f45-9708-019B960494DF}">
-                <a14:hiddenLine xmlns="" xmlns:a14="http://schemas.microsoft.com/office/drawing/2010/main" w="9525">
+                <a14:hiddenLine xmlns:a14="http://schemas.microsoft.com/office/drawing/2010/main" xmlns="" w="9525">
                   <a:solidFill>
                     <a:srgbClr val="000000"/>
                   </a:solidFill>
@@ -5452,7 +5452,7 @@
             </a:ln>
             <a:extLst>
               <a:ext uri="{91240B29-F687-4f45-9708-019B960494DF}">
-                <a14:hiddenLine xmlns="" xmlns:a14="http://schemas.microsoft.com/office/drawing/2010/main" w="9525">
+                <a14:hiddenLine xmlns:a14="http://schemas.microsoft.com/office/drawing/2010/main" xmlns="" w="9525">
                   <a:solidFill>
                     <a:srgbClr val="000000"/>
                   </a:solidFill>
@@ -5542,7 +5542,7 @@
             </a:ln>
             <a:extLst>
               <a:ext uri="{91240B29-F687-4f45-9708-019B960494DF}">
-                <a14:hiddenLine xmlns="" xmlns:a14="http://schemas.microsoft.com/office/drawing/2010/main" w="9525">
+                <a14:hiddenLine xmlns:a14="http://schemas.microsoft.com/office/drawing/2010/main" xmlns="" w="9525">
                   <a:solidFill>
                     <a:srgbClr val="000000"/>
                   </a:solidFill>
@@ -5610,7 +5610,7 @@
             </a:ln>
             <a:extLst>
               <a:ext uri="{91240B29-F687-4f45-9708-019B960494DF}">
-                <a14:hiddenLine xmlns="" xmlns:a14="http://schemas.microsoft.com/office/drawing/2010/main" w="9525">
+                <a14:hiddenLine xmlns:a14="http://schemas.microsoft.com/office/drawing/2010/main" xmlns="" w="9525">
                   <a:solidFill>
                     <a:srgbClr val="000000"/>
                   </a:solidFill>
@@ -5700,7 +5700,7 @@
             </a:ln>
             <a:extLst>
               <a:ext uri="{91240B29-F687-4f45-9708-019B960494DF}">
-                <a14:hiddenLine xmlns="" xmlns:a14="http://schemas.microsoft.com/office/drawing/2010/main" w="9525">
+                <a14:hiddenLine xmlns:a14="http://schemas.microsoft.com/office/drawing/2010/main" xmlns="" w="9525">
                   <a:solidFill>
                     <a:srgbClr val="000000"/>
                   </a:solidFill>
@@ -5768,7 +5768,7 @@
             </a:ln>
             <a:extLst>
               <a:ext uri="{91240B29-F687-4f45-9708-019B960494DF}">
-                <a14:hiddenLine xmlns="" xmlns:a14="http://schemas.microsoft.com/office/drawing/2010/main" w="9525">
+                <a14:hiddenLine xmlns:a14="http://schemas.microsoft.com/office/drawing/2010/main" xmlns="" w="9525">
                   <a:solidFill>
                     <a:srgbClr val="000000"/>
                   </a:solidFill>
@@ -5858,7 +5858,7 @@
             </a:ln>
             <a:extLst>
               <a:ext uri="{91240B29-F687-4f45-9708-019B960494DF}">
-                <a14:hiddenLine xmlns="" xmlns:a14="http://schemas.microsoft.com/office/drawing/2010/main" w="9525">
+                <a14:hiddenLine xmlns:a14="http://schemas.microsoft.com/office/drawing/2010/main" xmlns="" w="9525">
                   <a:solidFill>
                     <a:srgbClr val="000000"/>
                   </a:solidFill>
@@ -5892,7 +5892,7 @@
             </a:ln>
             <a:extLst>
               <a:ext uri="{91240B29-F687-4f45-9708-019B960494DF}">
-                <a14:hiddenLine xmlns="" xmlns:a14="http://schemas.microsoft.com/office/drawing/2010/main" w="9525">
+                <a14:hiddenLine xmlns:a14="http://schemas.microsoft.com/office/drawing/2010/main" xmlns="" w="9525">
                   <a:solidFill>
                     <a:srgbClr val="000000"/>
                   </a:solidFill>
@@ -5982,7 +5982,7 @@
             </a:ln>
             <a:extLst>
               <a:ext uri="{91240B29-F687-4f45-9708-019B960494DF}">
-                <a14:hiddenLine xmlns="" xmlns:a14="http://schemas.microsoft.com/office/drawing/2010/main" w="9525">
+                <a14:hiddenLine xmlns:a14="http://schemas.microsoft.com/office/drawing/2010/main" xmlns="" w="9525">
                   <a:solidFill>
                     <a:srgbClr val="000000"/>
                   </a:solidFill>
@@ -6044,7 +6044,7 @@
             </a:ln>
             <a:extLst>
               <a:ext uri="{91240B29-F687-4f45-9708-019B960494DF}">
-                <a14:hiddenLine xmlns="" xmlns:a14="http://schemas.microsoft.com/office/drawing/2010/main" w="9525">
+                <a14:hiddenLine xmlns:a14="http://schemas.microsoft.com/office/drawing/2010/main" xmlns="" w="9525">
                   <a:solidFill>
                     <a:srgbClr val="000000"/>
                   </a:solidFill>
@@ -6106,7 +6106,7 @@
             </a:ln>
             <a:extLst>
               <a:ext uri="{91240B29-F687-4f45-9708-019B960494DF}">
-                <a14:hiddenLine xmlns="" xmlns:a14="http://schemas.microsoft.com/office/drawing/2010/main" w="9525">
+                <a14:hiddenLine xmlns:a14="http://schemas.microsoft.com/office/drawing/2010/main" xmlns="" w="9525">
                   <a:solidFill>
                     <a:srgbClr val="000000"/>
                   </a:solidFill>
@@ -6196,7 +6196,7 @@
             </a:ln>
             <a:extLst>
               <a:ext uri="{91240B29-F687-4f45-9708-019B960494DF}">
-                <a14:hiddenLine xmlns="" xmlns:a14="http://schemas.microsoft.com/office/drawing/2010/main" w="9525">
+                <a14:hiddenLine xmlns:a14="http://schemas.microsoft.com/office/drawing/2010/main" xmlns="" w="9525">
                   <a:solidFill>
                     <a:srgbClr val="000000"/>
                   </a:solidFill>
@@ -6264,7 +6264,7 @@
             </a:ln>
             <a:extLst>
               <a:ext uri="{91240B29-F687-4f45-9708-019B960494DF}">
-                <a14:hiddenLine xmlns="" xmlns:a14="http://schemas.microsoft.com/office/drawing/2010/main" w="9525">
+                <a14:hiddenLine xmlns:a14="http://schemas.microsoft.com/office/drawing/2010/main" xmlns="" w="9525">
                   <a:solidFill>
                     <a:srgbClr val="000000"/>
                   </a:solidFill>
@@ -6326,7 +6326,7 @@
             </a:ln>
             <a:extLst>
               <a:ext uri="{91240B29-F687-4f45-9708-019B960494DF}">
-                <a14:hiddenLine xmlns="" xmlns:a14="http://schemas.microsoft.com/office/drawing/2010/main" w="9525">
+                <a14:hiddenLine xmlns:a14="http://schemas.microsoft.com/office/drawing/2010/main" xmlns="" w="9525">
                   <a:solidFill>
                     <a:srgbClr val="000000"/>
                   </a:solidFill>
@@ -6416,7 +6416,7 @@
             </a:ln>
             <a:extLst>
               <a:ext uri="{91240B29-F687-4f45-9708-019B960494DF}">
-                <a14:hiddenLine xmlns="" xmlns:a14="http://schemas.microsoft.com/office/drawing/2010/main" w="9525">
+                <a14:hiddenLine xmlns:a14="http://schemas.microsoft.com/office/drawing/2010/main" xmlns="" w="9525">
                   <a:solidFill>
                     <a:srgbClr val="000000"/>
                   </a:solidFill>
@@ -6478,7 +6478,7 @@
             </a:ln>
             <a:extLst>
               <a:ext uri="{91240B29-F687-4f45-9708-019B960494DF}">
-                <a14:hiddenLine xmlns="" xmlns:a14="http://schemas.microsoft.com/office/drawing/2010/main" w="9525">
+                <a14:hiddenLine xmlns:a14="http://schemas.microsoft.com/office/drawing/2010/main" xmlns="" w="9525">
                   <a:solidFill>
                     <a:srgbClr val="000000"/>
                   </a:solidFill>
@@ -6568,7 +6568,7 @@
             </a:ln>
             <a:extLst>
               <a:ext uri="{91240B29-F687-4f45-9708-019B960494DF}">
-                <a14:hiddenLine xmlns="" xmlns:a14="http://schemas.microsoft.com/office/drawing/2010/main" w="9525">
+                <a14:hiddenLine xmlns:a14="http://schemas.microsoft.com/office/drawing/2010/main" xmlns="" w="9525">
                   <a:solidFill>
                     <a:srgbClr val="000000"/>
                   </a:solidFill>
@@ -6630,7 +6630,7 @@
             </a:ln>
             <a:extLst>
               <a:ext uri="{91240B29-F687-4f45-9708-019B960494DF}">
-                <a14:hiddenLine xmlns="" xmlns:a14="http://schemas.microsoft.com/office/drawing/2010/main" w="9525">
+                <a14:hiddenLine xmlns:a14="http://schemas.microsoft.com/office/drawing/2010/main" xmlns="" w="9525">
                   <a:solidFill>
                     <a:srgbClr val="000000"/>
                   </a:solidFill>
@@ -6720,7 +6720,7 @@
             </a:ln>
             <a:extLst>
               <a:ext uri="{91240B29-F687-4f45-9708-019B960494DF}">
-                <a14:hiddenLine xmlns="" xmlns:a14="http://schemas.microsoft.com/office/drawing/2010/main" w="9525">
+                <a14:hiddenLine xmlns:a14="http://schemas.microsoft.com/office/drawing/2010/main" xmlns="" w="9525">
                   <a:solidFill>
                     <a:srgbClr val="000000"/>
                   </a:solidFill>
@@ -6754,7 +6754,7 @@
             </a:ln>
             <a:extLst>
               <a:ext uri="{91240B29-F687-4f45-9708-019B960494DF}">
-                <a14:hiddenLine xmlns="" xmlns:a14="http://schemas.microsoft.com/office/drawing/2010/main" w="9525">
+                <a14:hiddenLine xmlns:a14="http://schemas.microsoft.com/office/drawing/2010/main" xmlns="" w="9525">
                   <a:solidFill>
                     <a:srgbClr val="000000"/>
                   </a:solidFill>
@@ -6819,7 +6819,7 @@
             </a:ln>
             <a:extLst>
               <a:ext uri="{91240B29-F687-4f45-9708-019B960494DF}">
-                <a14:hiddenLine xmlns="" xmlns:a14="http://schemas.microsoft.com/office/drawing/2010/main" w="9525">
+                <a14:hiddenLine xmlns:a14="http://schemas.microsoft.com/office/drawing/2010/main" xmlns="" w="9525">
                   <a:solidFill>
                     <a:srgbClr val="000000"/>
                   </a:solidFill>
@@ -6909,7 +6909,7 @@
             </a:ln>
             <a:extLst>
               <a:ext uri="{91240B29-F687-4f45-9708-019B960494DF}">
-                <a14:hiddenLine xmlns="" xmlns:a14="http://schemas.microsoft.com/office/drawing/2010/main" w="9525">
+                <a14:hiddenLine xmlns:a14="http://schemas.microsoft.com/office/drawing/2010/main" xmlns="" w="9525">
                   <a:solidFill>
                     <a:srgbClr val="000000"/>
                   </a:solidFill>
@@ -6971,7 +6971,7 @@
             </a:ln>
             <a:extLst>
               <a:ext uri="{91240B29-F687-4f45-9708-019B960494DF}">
-                <a14:hiddenLine xmlns="" xmlns:a14="http://schemas.microsoft.com/office/drawing/2010/main" w="9525">
+                <a14:hiddenLine xmlns:a14="http://schemas.microsoft.com/office/drawing/2010/main" xmlns="" w="9525">
                   <a:solidFill>
                     <a:srgbClr val="000000"/>
                   </a:solidFill>
@@ -7061,7 +7061,7 @@
             </a:ln>
             <a:extLst>
               <a:ext uri="{91240B29-F687-4f45-9708-019B960494DF}">
-                <a14:hiddenLine xmlns="" xmlns:a14="http://schemas.microsoft.com/office/drawing/2010/main" w="9525">
+                <a14:hiddenLine xmlns:a14="http://schemas.microsoft.com/office/drawing/2010/main" xmlns="" w="9525">
                   <a:solidFill>
                     <a:srgbClr val="000000"/>
                   </a:solidFill>
@@ -7151,7 +7151,7 @@
             </a:ln>
             <a:extLst>
               <a:ext uri="{91240B29-F687-4f45-9708-019B960494DF}">
-                <a14:hiddenLine xmlns="" xmlns:a14="http://schemas.microsoft.com/office/drawing/2010/main" w="9525">
+                <a14:hiddenLine xmlns:a14="http://schemas.microsoft.com/office/drawing/2010/main" xmlns="" w="9525">
                   <a:solidFill>
                     <a:srgbClr val="000000"/>
                   </a:solidFill>
@@ -7216,7 +7216,7 @@
             </a:ln>
             <a:extLst>
               <a:ext uri="{91240B29-F687-4f45-9708-019B960494DF}">
-                <a14:hiddenLine xmlns="" xmlns:a14="http://schemas.microsoft.com/office/drawing/2010/main" w="9525">
+                <a14:hiddenLine xmlns:a14="http://schemas.microsoft.com/office/drawing/2010/main" xmlns="" w="9525">
                   <a:solidFill>
                     <a:srgbClr val="000000"/>
                   </a:solidFill>
@@ -7278,7 +7278,7 @@
             </a:ln>
             <a:extLst>
               <a:ext uri="{91240B29-F687-4f45-9708-019B960494DF}">
-                <a14:hiddenLine xmlns="" xmlns:a14="http://schemas.microsoft.com/office/drawing/2010/main" w="9525">
+                <a14:hiddenLine xmlns:a14="http://schemas.microsoft.com/office/drawing/2010/main" xmlns="" w="9525">
                   <a:solidFill>
                     <a:srgbClr val="000000"/>
                   </a:solidFill>
@@ -7368,7 +7368,7 @@
             </a:ln>
             <a:extLst>
               <a:ext uri="{91240B29-F687-4f45-9708-019B960494DF}">
-                <a14:hiddenLine xmlns="" xmlns:a14="http://schemas.microsoft.com/office/drawing/2010/main" w="9525">
+                <a14:hiddenLine xmlns:a14="http://schemas.microsoft.com/office/drawing/2010/main" xmlns="" w="9525">
                   <a:solidFill>
                     <a:srgbClr val="000000"/>
                   </a:solidFill>
@@ -7458,7 +7458,7 @@
             </a:ln>
             <a:extLst>
               <a:ext uri="{91240B29-F687-4f45-9708-019B960494DF}">
-                <a14:hiddenLine xmlns="" xmlns:a14="http://schemas.microsoft.com/office/drawing/2010/main" w="9525">
+                <a14:hiddenLine xmlns:a14="http://schemas.microsoft.com/office/drawing/2010/main" xmlns="" w="9525">
                   <a:solidFill>
                     <a:srgbClr val="000000"/>
                   </a:solidFill>
@@ -7520,7 +7520,7 @@
             </a:ln>
             <a:extLst>
               <a:ext uri="{91240B29-F687-4f45-9708-019B960494DF}">
-                <a14:hiddenLine xmlns="" xmlns:a14="http://schemas.microsoft.com/office/drawing/2010/main" w="9525">
+                <a14:hiddenLine xmlns:a14="http://schemas.microsoft.com/office/drawing/2010/main" xmlns="" w="9525">
                   <a:solidFill>
                     <a:srgbClr val="000000"/>
                   </a:solidFill>
@@ -7640,7 +7640,7 @@
             </a:ln>
             <a:extLst>
               <a:ext uri="{91240B29-F687-4f45-9708-019B960494DF}">
-                <a14:hiddenLine xmlns="" xmlns:a14="http://schemas.microsoft.com/office/drawing/2010/main" w="9525">
+                <a14:hiddenLine xmlns:a14="http://schemas.microsoft.com/office/drawing/2010/main" xmlns="" w="9525">
                   <a:solidFill>
                     <a:srgbClr val="000000"/>
                   </a:solidFill>
@@ -7708,7 +7708,7 @@
             </a:ln>
             <a:extLst>
               <a:ext uri="{91240B29-F687-4f45-9708-019B960494DF}">
-                <a14:hiddenLine xmlns="" xmlns:a14="http://schemas.microsoft.com/office/drawing/2010/main" w="9525">
+                <a14:hiddenLine xmlns:a14="http://schemas.microsoft.com/office/drawing/2010/main" xmlns="" w="9525">
                   <a:solidFill>
                     <a:srgbClr val="000000"/>
                   </a:solidFill>
@@ -7798,7 +7798,7 @@
             </a:ln>
             <a:extLst>
               <a:ext uri="{91240B29-F687-4f45-9708-019B960494DF}">
-                <a14:hiddenLine xmlns="" xmlns:a14="http://schemas.microsoft.com/office/drawing/2010/main" w="9525">
+                <a14:hiddenLine xmlns:a14="http://schemas.microsoft.com/office/drawing/2010/main" xmlns="" w="9525">
                   <a:solidFill>
                     <a:srgbClr val="000000"/>
                   </a:solidFill>
@@ -12527,7 +12527,7 @@
           <a:noFill/>
           <a:extLst>
             <a:ext uri="{909E8E84-426E-40dd-AFC4-6F175D3DCCD1}">
-              <a14:hiddenFill xmlns="" xmlns:a14="http://schemas.microsoft.com/office/drawing/2010/main">
+              <a14:hiddenFill xmlns:a14="http://schemas.microsoft.com/office/drawing/2010/main" xmlns="">
                 <a:solidFill>
                   <a:srgbClr val="FFFFFF"/>
                 </a:solidFill>
@@ -12601,7 +12601,7 @@
               </a:ln>
               <a:extLst>
                 <a:ext uri="{91240B29-F687-4f45-9708-019B960494DF}">
-                  <a14:hiddenLine xmlns="" xmlns:a14="http://schemas.microsoft.com/office/drawing/2010/main" w="9525">
+                  <a14:hiddenLine xmlns:a14="http://schemas.microsoft.com/office/drawing/2010/main" xmlns="" w="9525">
                     <a:solidFill>
                       <a:srgbClr val="000000"/>
                     </a:solidFill>
@@ -12691,7 +12691,7 @@
               </a:ln>
               <a:extLst>
                 <a:ext uri="{91240B29-F687-4f45-9708-019B960494DF}">
-                  <a14:hiddenLine xmlns="" xmlns:a14="http://schemas.microsoft.com/office/drawing/2010/main" w="9525">
+                  <a14:hiddenLine xmlns:a14="http://schemas.microsoft.com/office/drawing/2010/main" xmlns="" w="9525">
                     <a:solidFill>
                       <a:srgbClr val="000000"/>
                     </a:solidFill>
@@ -12781,7 +12781,7 @@
               </a:ln>
               <a:extLst>
                 <a:ext uri="{91240B29-F687-4f45-9708-019B960494DF}">
-                  <a14:hiddenLine xmlns="" xmlns:a14="http://schemas.microsoft.com/office/drawing/2010/main" w="9525">
+                  <a14:hiddenLine xmlns:a14="http://schemas.microsoft.com/office/drawing/2010/main" xmlns="" w="9525">
                     <a:solidFill>
                       <a:srgbClr val="000000"/>
                     </a:solidFill>
@@ -12843,7 +12843,7 @@
               </a:ln>
               <a:extLst>
                 <a:ext uri="{91240B29-F687-4f45-9708-019B960494DF}">
-                  <a14:hiddenLine xmlns="" xmlns:a14="http://schemas.microsoft.com/office/drawing/2010/main" w="9525">
+                  <a14:hiddenLine xmlns:a14="http://schemas.microsoft.com/office/drawing/2010/main" xmlns="" w="9525">
                     <a:solidFill>
                       <a:srgbClr val="000000"/>
                     </a:solidFill>
@@ -12933,7 +12933,7 @@
               </a:ln>
               <a:extLst>
                 <a:ext uri="{91240B29-F687-4f45-9708-019B960494DF}">
-                  <a14:hiddenLine xmlns="" xmlns:a14="http://schemas.microsoft.com/office/drawing/2010/main" w="9525">
+                  <a14:hiddenLine xmlns:a14="http://schemas.microsoft.com/office/drawing/2010/main" xmlns="" w="9525">
                     <a:solidFill>
                       <a:srgbClr val="000000"/>
                     </a:solidFill>
@@ -12995,7 +12995,7 @@
               </a:ln>
               <a:extLst>
                 <a:ext uri="{91240B29-F687-4f45-9708-019B960494DF}">
-                  <a14:hiddenLine xmlns="" xmlns:a14="http://schemas.microsoft.com/office/drawing/2010/main" w="9525">
+                  <a14:hiddenLine xmlns:a14="http://schemas.microsoft.com/office/drawing/2010/main" xmlns="" w="9525">
                     <a:solidFill>
                       <a:srgbClr val="000000"/>
                     </a:solidFill>
@@ -13057,7 +13057,7 @@
               </a:ln>
               <a:extLst>
                 <a:ext uri="{91240B29-F687-4f45-9708-019B960494DF}">
-                  <a14:hiddenLine xmlns="" xmlns:a14="http://schemas.microsoft.com/office/drawing/2010/main" w="9525">
+                  <a14:hiddenLine xmlns:a14="http://schemas.microsoft.com/office/drawing/2010/main" xmlns="" w="9525">
                     <a:solidFill>
                       <a:srgbClr val="000000"/>
                     </a:solidFill>
@@ -13147,7 +13147,7 @@
               </a:ln>
               <a:extLst>
                 <a:ext uri="{91240B29-F687-4f45-9708-019B960494DF}">
-                  <a14:hiddenLine xmlns="" xmlns:a14="http://schemas.microsoft.com/office/drawing/2010/main" w="9525">
+                  <a14:hiddenLine xmlns:a14="http://schemas.microsoft.com/office/drawing/2010/main" xmlns="" w="9525">
                     <a:solidFill>
                       <a:srgbClr val="000000"/>
                     </a:solidFill>
@@ -13237,7 +13237,7 @@
               </a:ln>
               <a:extLst>
                 <a:ext uri="{91240B29-F687-4f45-9708-019B960494DF}">
-                  <a14:hiddenLine xmlns="" xmlns:a14="http://schemas.microsoft.com/office/drawing/2010/main" w="9525">
+                  <a14:hiddenLine xmlns:a14="http://schemas.microsoft.com/office/drawing/2010/main" xmlns="" w="9525">
                     <a:solidFill>
                       <a:srgbClr val="000000"/>
                     </a:solidFill>
@@ -13299,7 +13299,7 @@
               </a:ln>
               <a:extLst>
                 <a:ext uri="{91240B29-F687-4f45-9708-019B960494DF}">
-                  <a14:hiddenLine xmlns="" xmlns:a14="http://schemas.microsoft.com/office/drawing/2010/main" w="9525">
+                  <a14:hiddenLine xmlns:a14="http://schemas.microsoft.com/office/drawing/2010/main" xmlns="" w="9525">
                     <a:solidFill>
                       <a:srgbClr val="000000"/>
                     </a:solidFill>
@@ -13409,7 +13409,7 @@
               </a:ln>
               <a:extLst>
                 <a:ext uri="{91240B29-F687-4f45-9708-019B960494DF}">
-                  <a14:hiddenLine xmlns="" xmlns:a14="http://schemas.microsoft.com/office/drawing/2010/main" w="9525">
+                  <a14:hiddenLine xmlns:a14="http://schemas.microsoft.com/office/drawing/2010/main" xmlns="" w="9525">
                     <a:solidFill>
                       <a:srgbClr val="000000"/>
                     </a:solidFill>
@@ -13493,7 +13493,7 @@
               </a:ln>
               <a:extLst>
                 <a:ext uri="{91240B29-F687-4f45-9708-019B960494DF}">
-                  <a14:hiddenLine xmlns="" xmlns:a14="http://schemas.microsoft.com/office/drawing/2010/main" w="9525">
+                  <a14:hiddenLine xmlns:a14="http://schemas.microsoft.com/office/drawing/2010/main" xmlns="" w="9525">
                     <a:solidFill>
                       <a:srgbClr val="000000"/>
                     </a:solidFill>
@@ -13555,7 +13555,7 @@
               </a:ln>
               <a:extLst>
                 <a:ext uri="{91240B29-F687-4f45-9708-019B960494DF}">
-                  <a14:hiddenLine xmlns="" xmlns:a14="http://schemas.microsoft.com/office/drawing/2010/main" w="9525">
+                  <a14:hiddenLine xmlns:a14="http://schemas.microsoft.com/office/drawing/2010/main" xmlns="" w="9525">
                     <a:solidFill>
                       <a:srgbClr val="000000"/>
                     </a:solidFill>
@@ -13617,7 +13617,7 @@
               </a:ln>
               <a:extLst>
                 <a:ext uri="{91240B29-F687-4f45-9708-019B960494DF}">
-                  <a14:hiddenLine xmlns="" xmlns:a14="http://schemas.microsoft.com/office/drawing/2010/main" w="9525">
+                  <a14:hiddenLine xmlns:a14="http://schemas.microsoft.com/office/drawing/2010/main" xmlns="" w="9525">
                     <a:solidFill>
                       <a:srgbClr val="000000"/>
                     </a:solidFill>
@@ -13707,7 +13707,7 @@
               </a:ln>
               <a:extLst>
                 <a:ext uri="{91240B29-F687-4f45-9708-019B960494DF}">
-                  <a14:hiddenLine xmlns="" xmlns:a14="http://schemas.microsoft.com/office/drawing/2010/main" w="9525">
+                  <a14:hiddenLine xmlns:a14="http://schemas.microsoft.com/office/drawing/2010/main" xmlns="" w="9525">
                     <a:solidFill>
                       <a:srgbClr val="000000"/>
                     </a:solidFill>
@@ -13741,7 +13741,7 @@
               </a:ln>
               <a:extLst>
                 <a:ext uri="{91240B29-F687-4f45-9708-019B960494DF}">
-                  <a14:hiddenLine xmlns="" xmlns:a14="http://schemas.microsoft.com/office/drawing/2010/main" w="9525">
+                  <a14:hiddenLine xmlns:a14="http://schemas.microsoft.com/office/drawing/2010/main" xmlns="" w="9525">
                     <a:solidFill>
                       <a:srgbClr val="000000"/>
                     </a:solidFill>
@@ -13806,7 +13806,7 @@
               </a:ln>
               <a:extLst>
                 <a:ext uri="{91240B29-F687-4f45-9708-019B960494DF}">
-                  <a14:hiddenLine xmlns="" xmlns:a14="http://schemas.microsoft.com/office/drawing/2010/main" w="9525">
+                  <a14:hiddenLine xmlns:a14="http://schemas.microsoft.com/office/drawing/2010/main" xmlns="" w="9525">
                     <a:solidFill>
                       <a:srgbClr val="000000"/>
                     </a:solidFill>
@@ -13896,7 +13896,7 @@
               </a:ln>
               <a:extLst>
                 <a:ext uri="{91240B29-F687-4f45-9708-019B960494DF}">
-                  <a14:hiddenLine xmlns="" xmlns:a14="http://schemas.microsoft.com/office/drawing/2010/main" w="9525">
+                  <a14:hiddenLine xmlns:a14="http://schemas.microsoft.com/office/drawing/2010/main" xmlns="" w="9525">
                     <a:solidFill>
                       <a:srgbClr val="000000"/>
                     </a:solidFill>
@@ -13958,7 +13958,7 @@
               </a:ln>
               <a:extLst>
                 <a:ext uri="{91240B29-F687-4f45-9708-019B960494DF}">
-                  <a14:hiddenLine xmlns="" xmlns:a14="http://schemas.microsoft.com/office/drawing/2010/main" w="9525">
+                  <a14:hiddenLine xmlns:a14="http://schemas.microsoft.com/office/drawing/2010/main" xmlns="" w="9525">
                     <a:solidFill>
                       <a:srgbClr val="000000"/>
                     </a:solidFill>
@@ -14048,7 +14048,7 @@
               </a:ln>
               <a:extLst>
                 <a:ext uri="{91240B29-F687-4f45-9708-019B960494DF}">
-                  <a14:hiddenLine xmlns="" xmlns:a14="http://schemas.microsoft.com/office/drawing/2010/main" w="9525">
+                  <a14:hiddenLine xmlns:a14="http://schemas.microsoft.com/office/drawing/2010/main" xmlns="" w="9525">
                     <a:solidFill>
                       <a:srgbClr val="000000"/>
                     </a:solidFill>
@@ -14113,7 +14113,7 @@
               </a:ln>
               <a:extLst>
                 <a:ext uri="{91240B29-F687-4f45-9708-019B960494DF}">
-                  <a14:hiddenLine xmlns="" xmlns:a14="http://schemas.microsoft.com/office/drawing/2010/main" w="9525">
+                  <a14:hiddenLine xmlns:a14="http://schemas.microsoft.com/office/drawing/2010/main" xmlns="" w="9525">
                     <a:solidFill>
                       <a:srgbClr val="000000"/>
                     </a:solidFill>
@@ -14175,7 +14175,7 @@
               </a:ln>
               <a:extLst>
                 <a:ext uri="{91240B29-F687-4f45-9708-019B960494DF}">
-                  <a14:hiddenLine xmlns="" xmlns:a14="http://schemas.microsoft.com/office/drawing/2010/main" w="9525">
+                  <a14:hiddenLine xmlns:a14="http://schemas.microsoft.com/office/drawing/2010/main" xmlns="" w="9525">
                     <a:solidFill>
                       <a:srgbClr val="000000"/>
                     </a:solidFill>
@@ -14265,7 +14265,7 @@
               </a:ln>
               <a:extLst>
                 <a:ext uri="{91240B29-F687-4f45-9708-019B960494DF}">
-                  <a14:hiddenLine xmlns="" xmlns:a14="http://schemas.microsoft.com/office/drawing/2010/main" w="9525">
+                  <a14:hiddenLine xmlns:a14="http://schemas.microsoft.com/office/drawing/2010/main" xmlns="" w="9525">
                     <a:solidFill>
                       <a:srgbClr val="000000"/>
                     </a:solidFill>
@@ -14355,7 +14355,7 @@
               </a:ln>
               <a:extLst>
                 <a:ext uri="{91240B29-F687-4f45-9708-019B960494DF}">
-                  <a14:hiddenLine xmlns="" xmlns:a14="http://schemas.microsoft.com/office/drawing/2010/main" w="9525">
+                  <a14:hiddenLine xmlns:a14="http://schemas.microsoft.com/office/drawing/2010/main" xmlns="" w="9525">
                     <a:solidFill>
                       <a:srgbClr val="000000"/>
                     </a:solidFill>
@@ -14420,7 +14420,7 @@
               </a:ln>
               <a:extLst>
                 <a:ext uri="{91240B29-F687-4f45-9708-019B960494DF}">
-                  <a14:hiddenLine xmlns="" xmlns:a14="http://schemas.microsoft.com/office/drawing/2010/main" w="9525">
+                  <a14:hiddenLine xmlns:a14="http://schemas.microsoft.com/office/drawing/2010/main" xmlns="" w="9525">
                     <a:solidFill>
                       <a:srgbClr val="000000"/>
                     </a:solidFill>
@@ -14540,7 +14540,7 @@
               </a:ln>
               <a:extLst>
                 <a:ext uri="{91240B29-F687-4f45-9708-019B960494DF}">
-                  <a14:hiddenLine xmlns="" xmlns:a14="http://schemas.microsoft.com/office/drawing/2010/main" w="9525">
+                  <a14:hiddenLine xmlns:a14="http://schemas.microsoft.com/office/drawing/2010/main" xmlns="" w="9525">
                     <a:solidFill>
                       <a:srgbClr val="000000"/>
                     </a:solidFill>
@@ -14621,7 +14621,7 @@
               </a:ln>
               <a:extLst>
                 <a:ext uri="{91240B29-F687-4f45-9708-019B960494DF}">
-                  <a14:hiddenLine xmlns="" xmlns:a14="http://schemas.microsoft.com/office/drawing/2010/main" w="9525">
+                  <a14:hiddenLine xmlns:a14="http://schemas.microsoft.com/office/drawing/2010/main" xmlns="" w="9525">
                     <a:solidFill>
                       <a:srgbClr val="000000"/>
                     </a:solidFill>
@@ -14736,7 +14736,7 @@
               </a:ln>
               <a:extLst>
                 <a:ext uri="{91240B29-F687-4f45-9708-019B960494DF}">
-                  <a14:hiddenLine xmlns="" xmlns:a14="http://schemas.microsoft.com/office/drawing/2010/main" w="9525">
+                  <a14:hiddenLine xmlns:a14="http://schemas.microsoft.com/office/drawing/2010/main" xmlns="" w="9525">
                     <a:solidFill>
                       <a:srgbClr val="000000"/>
                     </a:solidFill>
@@ -14826,7 +14826,7 @@
               </a:ln>
               <a:extLst>
                 <a:ext uri="{91240B29-F687-4f45-9708-019B960494DF}">
-                  <a14:hiddenLine xmlns="" xmlns:a14="http://schemas.microsoft.com/office/drawing/2010/main" w="9525">
+                  <a14:hiddenLine xmlns:a14="http://schemas.microsoft.com/office/drawing/2010/main" xmlns="" w="9525">
                     <a:solidFill>
                       <a:srgbClr val="000000"/>
                     </a:solidFill>
@@ -14891,7 +14891,7 @@
               </a:ln>
               <a:extLst>
                 <a:ext uri="{91240B29-F687-4f45-9708-019B960494DF}">
-                  <a14:hiddenLine xmlns="" xmlns:a14="http://schemas.microsoft.com/office/drawing/2010/main" w="9525">
+                  <a14:hiddenLine xmlns:a14="http://schemas.microsoft.com/office/drawing/2010/main" xmlns="" w="9525">
                     <a:solidFill>
                       <a:srgbClr val="000000"/>
                     </a:solidFill>
@@ -14981,7 +14981,7 @@
               </a:ln>
               <a:extLst>
                 <a:ext uri="{91240B29-F687-4f45-9708-019B960494DF}">
-                  <a14:hiddenLine xmlns="" xmlns:a14="http://schemas.microsoft.com/office/drawing/2010/main" w="9525">
+                  <a14:hiddenLine xmlns:a14="http://schemas.microsoft.com/office/drawing/2010/main" xmlns="" w="9525">
                     <a:solidFill>
                       <a:srgbClr val="000000"/>
                     </a:solidFill>
@@ -15049,7 +15049,7 @@
               </a:ln>
               <a:extLst>
                 <a:ext uri="{91240B29-F687-4f45-9708-019B960494DF}">
-                  <a14:hiddenLine xmlns="" xmlns:a14="http://schemas.microsoft.com/office/drawing/2010/main" w="9525">
+                  <a14:hiddenLine xmlns:a14="http://schemas.microsoft.com/office/drawing/2010/main" xmlns="" w="9525">
                     <a:solidFill>
                       <a:srgbClr val="000000"/>
                     </a:solidFill>
@@ -15139,7 +15139,7 @@
               </a:ln>
               <a:extLst>
                 <a:ext uri="{91240B29-F687-4f45-9708-019B960494DF}">
-                  <a14:hiddenLine xmlns="" xmlns:a14="http://schemas.microsoft.com/office/drawing/2010/main" w="9525">
+                  <a14:hiddenLine xmlns:a14="http://schemas.microsoft.com/office/drawing/2010/main" xmlns="" w="9525">
                     <a:solidFill>
                       <a:srgbClr val="000000"/>
                     </a:solidFill>
@@ -15207,7 +15207,7 @@
               </a:ln>
               <a:extLst>
                 <a:ext uri="{91240B29-F687-4f45-9708-019B960494DF}">
-                  <a14:hiddenLine xmlns="" xmlns:a14="http://schemas.microsoft.com/office/drawing/2010/main" w="9525">
+                  <a14:hiddenLine xmlns:a14="http://schemas.microsoft.com/office/drawing/2010/main" xmlns="" w="9525">
                     <a:solidFill>
                       <a:srgbClr val="000000"/>
                     </a:solidFill>
@@ -15297,7 +15297,7 @@
               </a:ln>
               <a:extLst>
                 <a:ext uri="{91240B29-F687-4f45-9708-019B960494DF}">
-                  <a14:hiddenLine xmlns="" xmlns:a14="http://schemas.microsoft.com/office/drawing/2010/main" w="9525">
+                  <a14:hiddenLine xmlns:a14="http://schemas.microsoft.com/office/drawing/2010/main" xmlns="" w="9525">
                     <a:solidFill>
                       <a:srgbClr val="000000"/>
                     </a:solidFill>
@@ -15331,7 +15331,7 @@
               </a:ln>
               <a:extLst>
                 <a:ext uri="{91240B29-F687-4f45-9708-019B960494DF}">
-                  <a14:hiddenLine xmlns="" xmlns:a14="http://schemas.microsoft.com/office/drawing/2010/main" w="9525">
+                  <a14:hiddenLine xmlns:a14="http://schemas.microsoft.com/office/drawing/2010/main" xmlns="" w="9525">
                     <a:solidFill>
                       <a:srgbClr val="000000"/>
                     </a:solidFill>
@@ -16051,7 +16051,7 @@
             <p:ph idx="1"/>
             <p:extLst>
               <p:ext uri="{D42A27DB-BD31-4B8C-83A1-F6EECF244321}">
-                <p14:modId xmlns:p14="http://schemas.microsoft.com/office/powerpoint/2010/main" val="3656918455"/>
+                <p14:modId xmlns:p14="http://schemas.microsoft.com/office/powerpoint/2010/main" val="3538056412"/>
               </p:ext>
             </p:extLst>
           </p:nvPr>
@@ -17199,7 +17199,7 @@
             <p:ph idx="1"/>
             <p:extLst>
               <p:ext uri="{D42A27DB-BD31-4B8C-83A1-F6EECF244321}">
-                <p14:modId xmlns:p14="http://schemas.microsoft.com/office/powerpoint/2010/main" val="1826462611"/>
+                <p14:modId xmlns:p14="http://schemas.microsoft.com/office/powerpoint/2010/main" val="1086754975"/>
               </p:ext>
             </p:extLst>
           </p:nvPr>
@@ -17339,23 +17339,14 @@
             <a:pPr lvl="1"/>
             <a:r>
               <a:rPr lang="en-CA" dirty="0"/>
-              <a:t>Calculate the number of Threads per Block</a:t>
+              <a:t>Calculate the number of Threads per Block based resident threads and blocks</a:t>
             </a:r>
           </a:p>
           <a:p>
             <a:pPr lvl="1"/>
             <a:r>
               <a:rPr lang="en-CA" dirty="0"/>
-              <a:t>Calculate the number of Blocks based on the image</a:t>
-            </a:r>
-          </a:p>
-          <a:p>
-            <a:pPr marL="457200" lvl="1" indent="0">
-              <a:buNone/>
-            </a:pPr>
-            <a:r>
-              <a:rPr lang="en-CA" dirty="0"/>
-              <a:t>This improved the Kernel Concurrency to 23%</a:t>
+              <a:t>Calculate the number of Blocks based on the image and threads per Block</a:t>
             </a:r>
           </a:p>
         </p:txBody>

</xml_diff>

<commit_message>
add shared memory slide
</commit_message>
<xml_diff>
--- a/Project Presentation.pptx
+++ b/Project Presentation.pptx
@@ -14,9 +14,10 @@
     <p:sldId id="264" r:id="rId8"/>
     <p:sldId id="265" r:id="rId9"/>
     <p:sldId id="266" r:id="rId10"/>
-    <p:sldId id="267" r:id="rId11"/>
-    <p:sldId id="268" r:id="rId12"/>
-    <p:sldId id="269" r:id="rId13"/>
+    <p:sldId id="270" r:id="rId11"/>
+    <p:sldId id="267" r:id="rId12"/>
+    <p:sldId id="268" r:id="rId13"/>
+    <p:sldId id="269" r:id="rId14"/>
   </p:sldIdLst>
   <p:sldSz cx="12192000" cy="6858000"/>
   <p:notesSz cx="6858000" cy="9144000"/>
@@ -124,7 +125,7 @@
 </file>
 
 <file path=ppt/charts/chart1.xml><?xml version="1.0" encoding="utf-8"?>
-<c:chartSpace xmlns:c="http://schemas.openxmlformats.org/drawingml/2006/chart" xmlns:a="http://schemas.openxmlformats.org/drawingml/2006/main" xmlns:r="http://schemas.openxmlformats.org/officeDocument/2006/relationships">
+<c:chartSpace xmlns:c="http://schemas.openxmlformats.org/drawingml/2006/chart" xmlns:a="http://schemas.openxmlformats.org/drawingml/2006/main" xmlns:r="http://schemas.openxmlformats.org/officeDocument/2006/relationships" xmlns:c16r2="http://schemas.microsoft.com/office/drawing/2015/06/chart">
   <c:date1904 val="0"/>
   <c:lang val="en-US"/>
   <c:roundedCorners val="0"/>
@@ -168,7 +169,6 @@
           </a:p>
         </c:rich>
       </c:tx>
-      <c:layout/>
       <c:overlay val="0"/>
       <c:spPr>
         <a:noFill/>
@@ -276,19 +276,19 @@
                 <c:formatCode>#,##0</c:formatCode>
                 <c:ptCount val="5"/>
                 <c:pt idx="0">
-                  <c:v>1.0E6</c:v>
+                  <c:v>1000000</c:v>
                 </c:pt>
                 <c:pt idx="1">
-                  <c:v>5.0E6</c:v>
+                  <c:v>5000000</c:v>
                 </c:pt>
                 <c:pt idx="2">
-                  <c:v>1.0E7</c:v>
+                  <c:v>10000000</c:v>
                 </c:pt>
                 <c:pt idx="3">
-                  <c:v>5.0E7</c:v>
+                  <c:v>50000000</c:v>
                 </c:pt>
                 <c:pt idx="4">
-                  <c:v>1.0E8</c:v>
+                  <c:v>100000000</c:v>
                 </c:pt>
               </c:numCache>
             </c:numRef>
@@ -300,24 +300,24 @@
                 <c:formatCode>General</c:formatCode>
                 <c:ptCount val="5"/>
                 <c:pt idx="0">
-                  <c:v>66.0</c:v>
+                  <c:v>66</c:v>
                 </c:pt>
                 <c:pt idx="1">
-                  <c:v>360.0</c:v>
+                  <c:v>360</c:v>
                 </c:pt>
                 <c:pt idx="2">
-                  <c:v>742.0</c:v>
+                  <c:v>742</c:v>
                 </c:pt>
                 <c:pt idx="3">
-                  <c:v>3983.0</c:v>
+                  <c:v>3983</c:v>
                 </c:pt>
                 <c:pt idx="4">
-                  <c:v>8393.0</c:v>
+                  <c:v>8393</c:v>
                 </c:pt>
               </c:numCache>
             </c:numRef>
           </c:val>
-          <c:extLst xmlns:c16r2="http://schemas.microsoft.com/office/drawing/2015/06/chart">
+          <c:extLst>
             <c:ext xmlns:c16="http://schemas.microsoft.com/office/drawing/2014/chart" uri="{C3380CC4-5D6E-409C-BE32-E72D297353CC}">
               <c16:uniqueId val="{00000000-CB48-4B2F-8E8C-1DAC6E9E3636}"/>
             </c:ext>
@@ -355,19 +355,19 @@
                 <c:formatCode>#,##0</c:formatCode>
                 <c:ptCount val="5"/>
                 <c:pt idx="0">
-                  <c:v>1.0E6</c:v>
+                  <c:v>1000000</c:v>
                 </c:pt>
                 <c:pt idx="1">
-                  <c:v>5.0E6</c:v>
+                  <c:v>5000000</c:v>
                 </c:pt>
                 <c:pt idx="2">
-                  <c:v>1.0E7</c:v>
+                  <c:v>10000000</c:v>
                 </c:pt>
                 <c:pt idx="3">
-                  <c:v>5.0E7</c:v>
+                  <c:v>50000000</c:v>
                 </c:pt>
                 <c:pt idx="4">
-                  <c:v>1.0E8</c:v>
+                  <c:v>100000000</c:v>
                 </c:pt>
               </c:numCache>
             </c:numRef>
@@ -379,24 +379,24 @@
                 <c:formatCode>General</c:formatCode>
                 <c:ptCount val="5"/>
                 <c:pt idx="0">
-                  <c:v>4.0</c:v>
+                  <c:v>4</c:v>
                 </c:pt>
                 <c:pt idx="1">
-                  <c:v>18.0</c:v>
+                  <c:v>18</c:v>
                 </c:pt>
                 <c:pt idx="2">
-                  <c:v>36.0</c:v>
+                  <c:v>36</c:v>
                 </c:pt>
                 <c:pt idx="3">
-                  <c:v>189.0</c:v>
+                  <c:v>189</c:v>
                 </c:pt>
                 <c:pt idx="4">
-                  <c:v>378.0</c:v>
+                  <c:v>378</c:v>
                 </c:pt>
               </c:numCache>
             </c:numRef>
           </c:val>
-          <c:extLst xmlns:c16r2="http://schemas.microsoft.com/office/drawing/2015/06/chart">
+          <c:extLst>
             <c:ext xmlns:c16="http://schemas.microsoft.com/office/drawing/2014/chart" uri="{C3380CC4-5D6E-409C-BE32-E72D297353CC}">
               <c16:uniqueId val="{00000001-CB48-4B2F-8E8C-1DAC6E9E3636}"/>
             </c:ext>
@@ -434,19 +434,19 @@
                 <c:formatCode>#,##0</c:formatCode>
                 <c:ptCount val="5"/>
                 <c:pt idx="0">
-                  <c:v>1.0E6</c:v>
+                  <c:v>1000000</c:v>
                 </c:pt>
                 <c:pt idx="1">
-                  <c:v>5.0E6</c:v>
+                  <c:v>5000000</c:v>
                 </c:pt>
                 <c:pt idx="2">
-                  <c:v>1.0E7</c:v>
+                  <c:v>10000000</c:v>
                 </c:pt>
                 <c:pt idx="3">
-                  <c:v>5.0E7</c:v>
+                  <c:v>50000000</c:v>
                 </c:pt>
                 <c:pt idx="4">
-                  <c:v>1.0E8</c:v>
+                  <c:v>100000000</c:v>
                 </c:pt>
               </c:numCache>
             </c:numRef>
@@ -458,24 +458,24 @@
                 <c:formatCode>General</c:formatCode>
                 <c:ptCount val="5"/>
                 <c:pt idx="0">
-                  <c:v>75.0</c:v>
+                  <c:v>75</c:v>
                 </c:pt>
                 <c:pt idx="1">
-                  <c:v>293.0</c:v>
+                  <c:v>293</c:v>
                 </c:pt>
                 <c:pt idx="2">
-                  <c:v>584.0</c:v>
+                  <c:v>584</c:v>
                 </c:pt>
                 <c:pt idx="3">
-                  <c:v>2343.0</c:v>
+                  <c:v>2343</c:v>
                 </c:pt>
                 <c:pt idx="4">
-                  <c:v>4649.0</c:v>
+                  <c:v>4649</c:v>
                 </c:pt>
               </c:numCache>
             </c:numRef>
           </c:val>
-          <c:extLst xmlns:c16r2="http://schemas.microsoft.com/office/drawing/2015/06/chart">
+          <c:extLst>
             <c:ext xmlns:c16="http://schemas.microsoft.com/office/drawing/2014/chart" uri="{C3380CC4-5D6E-409C-BE32-E72D297353CC}">
               <c16:uniqueId val="{00000002-CB48-4B2F-8E8C-1DAC6E9E3636}"/>
             </c:ext>
@@ -528,7 +528,6 @@
               </a:p>
             </c:rich>
           </c:tx>
-          <c:layout/>
           <c:overlay val="0"/>
           <c:spPr>
             <a:noFill/>
@@ -643,7 +642,6 @@
               </a:p>
             </c:rich>
           </c:tx>
-          <c:layout/>
           <c:overlay val="0"/>
           <c:spPr>
             <a:noFill/>
@@ -718,7 +716,6 @@
     </c:plotArea>
     <c:legend>
       <c:legendPos val="b"/>
-      <c:layout/>
       <c:overlay val="0"/>
       <c:spPr>
         <a:noFill/>
@@ -750,14 +747,14 @@
     </c:legend>
     <c:plotVisOnly val="1"/>
     <c:dispBlanksAs val="gap"/>
-    <c:showDLblsOverMax val="0"/>
-    <c:extLst xmlns:c16r2="http://schemas.microsoft.com/office/drawing/2015/06/chart">
+    <c:extLst>
       <c:ext xmlns:c16r3="http://schemas.microsoft.com/office/drawing/2017/03/chart" uri="{56B9EC1D-385E-4148-901F-78D8002777C0}">
         <c16r3:dataDisplayOptions16>
           <c16r3:dispNaAsBlank val="1"/>
         </c16r3:dataDisplayOptions16>
       </c:ext>
     </c:extLst>
+    <c:showDLblsOverMax val="0"/>
   </c:chart>
   <c:spPr>
     <a:noFill/>
@@ -783,7 +780,7 @@
 </file>
 
 <file path=ppt/charts/chart2.xml><?xml version="1.0" encoding="utf-8"?>
-<c:chartSpace xmlns:c="http://schemas.openxmlformats.org/drawingml/2006/chart" xmlns:a="http://schemas.openxmlformats.org/drawingml/2006/main" xmlns:r="http://schemas.openxmlformats.org/officeDocument/2006/relationships">
+<c:chartSpace xmlns:c="http://schemas.openxmlformats.org/drawingml/2006/chart" xmlns:a="http://schemas.openxmlformats.org/drawingml/2006/main" xmlns:r="http://schemas.openxmlformats.org/officeDocument/2006/relationships" xmlns:c16r2="http://schemas.microsoft.com/office/drawing/2015/06/chart">
   <c:date1904 val="0"/>
   <c:lang val="en-US"/>
   <c:roundedCorners val="0"/>
@@ -822,7 +819,6 @@
           </a:p>
         </c:rich>
       </c:tx>
-      <c:layout/>
       <c:overlay val="0"/>
       <c:spPr>
         <a:noFill/>
@@ -962,33 +958,33 @@
                 <c:formatCode>General</c:formatCode>
                 <c:ptCount val="8"/>
                 <c:pt idx="0">
-                  <c:v>1995.0</c:v>
+                  <c:v>1995</c:v>
                 </c:pt>
                 <c:pt idx="1">
-                  <c:v>8028.0</c:v>
+                  <c:v>8028</c:v>
                 </c:pt>
                 <c:pt idx="2">
-                  <c:v>19852.0</c:v>
+                  <c:v>19852</c:v>
                 </c:pt>
                 <c:pt idx="3">
-                  <c:v>34278.0</c:v>
+                  <c:v>34278</c:v>
                 </c:pt>
                 <c:pt idx="4">
-                  <c:v>50791.0</c:v>
+                  <c:v>50791</c:v>
                 </c:pt>
                 <c:pt idx="5">
-                  <c:v>73605.0</c:v>
+                  <c:v>73605</c:v>
                 </c:pt>
                 <c:pt idx="6">
-                  <c:v>102737.0</c:v>
+                  <c:v>102737</c:v>
                 </c:pt>
                 <c:pt idx="7">
-                  <c:v>134687.0</c:v>
+                  <c:v>134687</c:v>
                 </c:pt>
               </c:numCache>
             </c:numRef>
           </c:val>
-          <c:extLst xmlns:c16r2="http://schemas.microsoft.com/office/drawing/2015/06/chart">
+          <c:extLst>
             <c:ext xmlns:c16="http://schemas.microsoft.com/office/drawing/2014/chart" uri="{C3380CC4-5D6E-409C-BE32-E72D297353CC}">
               <c16:uniqueId val="{00000000-AB5A-4435-ACB9-E94E409BAADD}"/>
             </c:ext>
@@ -1058,33 +1054,33 @@
                 <c:formatCode>General</c:formatCode>
                 <c:ptCount val="8"/>
                 <c:pt idx="0">
-                  <c:v>180.0</c:v>
+                  <c:v>180</c:v>
                 </c:pt>
                 <c:pt idx="1">
-                  <c:v>192.0</c:v>
+                  <c:v>192</c:v>
                 </c:pt>
                 <c:pt idx="2">
-                  <c:v>288.0</c:v>
+                  <c:v>288</c:v>
                 </c:pt>
                 <c:pt idx="3">
-                  <c:v>407.0</c:v>
+                  <c:v>407</c:v>
                 </c:pt>
                 <c:pt idx="4">
-                  <c:v>528.0</c:v>
+                  <c:v>528</c:v>
                 </c:pt>
                 <c:pt idx="5">
-                  <c:v>754.0</c:v>
+                  <c:v>754</c:v>
                 </c:pt>
                 <c:pt idx="6">
-                  <c:v>911.0</c:v>
+                  <c:v>911</c:v>
                 </c:pt>
                 <c:pt idx="7">
-                  <c:v>1036.0</c:v>
+                  <c:v>1036</c:v>
                 </c:pt>
               </c:numCache>
             </c:numRef>
           </c:val>
-          <c:extLst xmlns:c16r2="http://schemas.microsoft.com/office/drawing/2015/06/chart">
+          <c:extLst>
             <c:ext xmlns:c16="http://schemas.microsoft.com/office/drawing/2014/chart" uri="{C3380CC4-5D6E-409C-BE32-E72D297353CC}">
               <c16:uniqueId val="{00000001-AB5A-4435-ACB9-E94E409BAADD}"/>
             </c:ext>
@@ -1137,7 +1133,6 @@
               </a:p>
             </c:rich>
           </c:tx>
-          <c:layout/>
           <c:overlay val="0"/>
           <c:spPr>
             <a:noFill/>
@@ -1271,7 +1266,6 @@
               </a:p>
             </c:rich>
           </c:tx>
-          <c:layout/>
           <c:overlay val="0"/>
           <c:spPr>
             <a:noFill/>
@@ -1360,7 +1354,6 @@
     </c:plotArea>
     <c:legend>
       <c:legendPos val="b"/>
-      <c:layout/>
       <c:overlay val="0"/>
       <c:spPr>
         <a:noFill/>
@@ -1392,14 +1385,14 @@
     </c:legend>
     <c:plotVisOnly val="1"/>
     <c:dispBlanksAs val="gap"/>
-    <c:showDLblsOverMax val="0"/>
-    <c:extLst xmlns:c16r2="http://schemas.microsoft.com/office/drawing/2015/06/chart">
+    <c:extLst>
       <c:ext xmlns:c16r3="http://schemas.microsoft.com/office/drawing/2017/03/chart" uri="{56B9EC1D-385E-4148-901F-78D8002777C0}">
         <c16r3:dataDisplayOptions16>
           <c16r3:dispNaAsBlank val="1"/>
         </c16r3:dataDisplayOptions16>
       </c:ext>
     </c:extLst>
+    <c:showDLblsOverMax val="0"/>
   </c:chart>
   <c:spPr>
     <a:noFill/>
@@ -1425,7 +1418,7 @@
 </file>
 
 <file path=ppt/charts/chart3.xml><?xml version="1.0" encoding="utf-8"?>
-<c:chartSpace xmlns:c="http://schemas.openxmlformats.org/drawingml/2006/chart" xmlns:a="http://schemas.openxmlformats.org/drawingml/2006/main" xmlns:r="http://schemas.openxmlformats.org/officeDocument/2006/relationships">
+<c:chartSpace xmlns:c="http://schemas.openxmlformats.org/drawingml/2006/chart" xmlns:a="http://schemas.openxmlformats.org/drawingml/2006/main" xmlns:r="http://schemas.openxmlformats.org/officeDocument/2006/relationships" xmlns:c16r2="http://schemas.microsoft.com/office/drawing/2015/06/chart">
   <c:date1904 val="0"/>
   <c:lang val="en-US"/>
   <c:roundedCorners val="0"/>
@@ -1464,7 +1457,6 @@
           </a:p>
         </c:rich>
       </c:tx>
-      <c:layout/>
       <c:overlay val="0"/>
       <c:spPr>
         <a:noFill/>
@@ -1604,33 +1596,33 @@
                 <c:formatCode>General</c:formatCode>
                 <c:ptCount val="8"/>
                 <c:pt idx="0">
-                  <c:v>180.0</c:v>
+                  <c:v>180</c:v>
                 </c:pt>
                 <c:pt idx="1">
-                  <c:v>192.0</c:v>
+                  <c:v>192</c:v>
                 </c:pt>
                 <c:pt idx="2">
-                  <c:v>288.0</c:v>
+                  <c:v>288</c:v>
                 </c:pt>
                 <c:pt idx="3">
-                  <c:v>407.0</c:v>
+                  <c:v>407</c:v>
                 </c:pt>
                 <c:pt idx="4">
-                  <c:v>528.0</c:v>
+                  <c:v>528</c:v>
                 </c:pt>
                 <c:pt idx="5">
-                  <c:v>754.0</c:v>
+                  <c:v>754</c:v>
                 </c:pt>
                 <c:pt idx="6">
-                  <c:v>911.0</c:v>
+                  <c:v>911</c:v>
                 </c:pt>
                 <c:pt idx="7">
-                  <c:v>1036.0</c:v>
+                  <c:v>1036</c:v>
                 </c:pt>
               </c:numCache>
             </c:numRef>
           </c:val>
-          <c:extLst xmlns:c16r2="http://schemas.microsoft.com/office/drawing/2015/06/chart">
+          <c:extLst>
             <c:ext xmlns:c16="http://schemas.microsoft.com/office/drawing/2014/chart" uri="{C3380CC4-5D6E-409C-BE32-E72D297353CC}">
               <c16:uniqueId val="{00000000-AB5A-4435-ACB9-E94E409BAADD}"/>
             </c:ext>
@@ -1700,33 +1692,33 @@
                 <c:formatCode>General</c:formatCode>
                 <c:ptCount val="8"/>
                 <c:pt idx="0">
-                  <c:v>140.0</c:v>
+                  <c:v>140</c:v>
                 </c:pt>
                 <c:pt idx="1">
-                  <c:v>189.0</c:v>
+                  <c:v>189</c:v>
                 </c:pt>
                 <c:pt idx="2">
-                  <c:v>279.0</c:v>
+                  <c:v>279</c:v>
                 </c:pt>
                 <c:pt idx="3">
-                  <c:v>394.0</c:v>
+                  <c:v>394</c:v>
                 </c:pt>
                 <c:pt idx="4">
-                  <c:v>527.0</c:v>
+                  <c:v>527</c:v>
                 </c:pt>
                 <c:pt idx="5">
-                  <c:v>689.0</c:v>
+                  <c:v>689</c:v>
                 </c:pt>
                 <c:pt idx="6">
-                  <c:v>904.0</c:v>
+                  <c:v>904</c:v>
                 </c:pt>
                 <c:pt idx="7">
-                  <c:v>1121.0</c:v>
+                  <c:v>1121</c:v>
                 </c:pt>
               </c:numCache>
             </c:numRef>
           </c:val>
-          <c:extLst xmlns:c16r2="http://schemas.microsoft.com/office/drawing/2015/06/chart">
+          <c:extLst>
             <c:ext xmlns:c16="http://schemas.microsoft.com/office/drawing/2014/chart" uri="{C3380CC4-5D6E-409C-BE32-E72D297353CC}">
               <c16:uniqueId val="{00000001-AB5A-4435-ACB9-E94E409BAADD}"/>
             </c:ext>
@@ -1779,7 +1771,6 @@
               </a:p>
             </c:rich>
           </c:tx>
-          <c:layout/>
           <c:overlay val="0"/>
           <c:spPr>
             <a:noFill/>
@@ -1913,7 +1904,6 @@
               </a:p>
             </c:rich>
           </c:tx>
-          <c:layout/>
           <c:overlay val="0"/>
           <c:spPr>
             <a:noFill/>
@@ -2002,7 +1992,6 @@
     </c:plotArea>
     <c:legend>
       <c:legendPos val="b"/>
-      <c:layout/>
       <c:overlay val="0"/>
       <c:spPr>
         <a:noFill/>
@@ -2034,14 +2023,14 @@
     </c:legend>
     <c:plotVisOnly val="1"/>
     <c:dispBlanksAs val="gap"/>
-    <c:showDLblsOverMax val="0"/>
-    <c:extLst xmlns:c16r2="http://schemas.microsoft.com/office/drawing/2015/06/chart">
+    <c:extLst>
       <c:ext xmlns:c16r3="http://schemas.microsoft.com/office/drawing/2017/03/chart" uri="{56B9EC1D-385E-4148-901F-78D8002777C0}">
         <c16r3:dataDisplayOptions16>
           <c16r3:dispNaAsBlank val="1"/>
         </c16r3:dataDisplayOptions16>
       </c:ext>
     </c:extLst>
+    <c:showDLblsOverMax val="0"/>
   </c:chart>
   <c:spPr>
     <a:noFill/>
@@ -3725,7 +3714,7 @@
           <a:noFill/>
           <a:extLst>
             <a:ext uri="{909E8E84-426E-40dd-AFC4-6F175D3DCCD1}">
-              <a14:hiddenFill xmlns="" xmlns:a14="http://schemas.microsoft.com/office/drawing/2010/main">
+              <a14:hiddenFill xmlns:a14="http://schemas.microsoft.com/office/drawing/2010/main" xmlns="">
                 <a:solidFill>
                   <a:srgbClr val="FFFFFF"/>
                 </a:solidFill>
@@ -3784,7 +3773,7 @@
             </a:ln>
             <a:extLst>
               <a:ext uri="{91240B29-F687-4f45-9708-019B960494DF}">
-                <a14:hiddenLine xmlns="" xmlns:a14="http://schemas.microsoft.com/office/drawing/2010/main" w="9525">
+                <a14:hiddenLine xmlns:a14="http://schemas.microsoft.com/office/drawing/2010/main" xmlns="" w="9525">
                   <a:solidFill>
                     <a:srgbClr val="000000"/>
                   </a:solidFill>
@@ -3874,7 +3863,7 @@
             </a:ln>
             <a:extLst>
               <a:ext uri="{91240B29-F687-4f45-9708-019B960494DF}">
-                <a14:hiddenLine xmlns="" xmlns:a14="http://schemas.microsoft.com/office/drawing/2010/main" w="9525">
+                <a14:hiddenLine xmlns:a14="http://schemas.microsoft.com/office/drawing/2010/main" xmlns="" w="9525">
                   <a:solidFill>
                     <a:srgbClr val="000000"/>
                   </a:solidFill>
@@ -3964,7 +3953,7 @@
             </a:ln>
             <a:extLst>
               <a:ext uri="{91240B29-F687-4f45-9708-019B960494DF}">
-                <a14:hiddenLine xmlns="" xmlns:a14="http://schemas.microsoft.com/office/drawing/2010/main" w="9525">
+                <a14:hiddenLine xmlns:a14="http://schemas.microsoft.com/office/drawing/2010/main" xmlns="" w="9525">
                   <a:solidFill>
                     <a:srgbClr val="000000"/>
                   </a:solidFill>
@@ -3998,7 +3987,7 @@
             </a:ln>
             <a:extLst>
               <a:ext uri="{91240B29-F687-4f45-9708-019B960494DF}">
-                <a14:hiddenLine xmlns="" xmlns:a14="http://schemas.microsoft.com/office/drawing/2010/main" w="9525">
+                <a14:hiddenLine xmlns:a14="http://schemas.microsoft.com/office/drawing/2010/main" xmlns="" w="9525">
                   <a:solidFill>
                     <a:srgbClr val="000000"/>
                   </a:solidFill>
@@ -4088,7 +4077,7 @@
             </a:ln>
             <a:extLst>
               <a:ext uri="{91240B29-F687-4f45-9708-019B960494DF}">
-                <a14:hiddenLine xmlns="" xmlns:a14="http://schemas.microsoft.com/office/drawing/2010/main" w="9525">
+                <a14:hiddenLine xmlns:a14="http://schemas.microsoft.com/office/drawing/2010/main" xmlns="" w="9525">
                   <a:solidFill>
                     <a:srgbClr val="000000"/>
                   </a:solidFill>
@@ -4150,7 +4139,7 @@
             </a:ln>
             <a:extLst>
               <a:ext uri="{91240B29-F687-4f45-9708-019B960494DF}">
-                <a14:hiddenLine xmlns="" xmlns:a14="http://schemas.microsoft.com/office/drawing/2010/main" w="9525">
+                <a14:hiddenLine xmlns:a14="http://schemas.microsoft.com/office/drawing/2010/main" xmlns="" w="9525">
                   <a:solidFill>
                     <a:srgbClr val="000000"/>
                   </a:solidFill>
@@ -4212,7 +4201,7 @@
             </a:ln>
             <a:extLst>
               <a:ext uri="{91240B29-F687-4f45-9708-019B960494DF}">
-                <a14:hiddenLine xmlns="" xmlns:a14="http://schemas.microsoft.com/office/drawing/2010/main" w="9525">
+                <a14:hiddenLine xmlns:a14="http://schemas.microsoft.com/office/drawing/2010/main" xmlns="" w="9525">
                   <a:solidFill>
                     <a:srgbClr val="000000"/>
                   </a:solidFill>
@@ -4302,7 +4291,7 @@
             </a:ln>
             <a:extLst>
               <a:ext uri="{91240B29-F687-4f45-9708-019B960494DF}">
-                <a14:hiddenLine xmlns="" xmlns:a14="http://schemas.microsoft.com/office/drawing/2010/main" w="9525">
+                <a14:hiddenLine xmlns:a14="http://schemas.microsoft.com/office/drawing/2010/main" xmlns="" w="9525">
                   <a:solidFill>
                     <a:srgbClr val="000000"/>
                   </a:solidFill>
@@ -4364,7 +4353,7 @@
             </a:ln>
             <a:extLst>
               <a:ext uri="{91240B29-F687-4f45-9708-019B960494DF}">
-                <a14:hiddenLine xmlns="" xmlns:a14="http://schemas.microsoft.com/office/drawing/2010/main" w="9525">
+                <a14:hiddenLine xmlns:a14="http://schemas.microsoft.com/office/drawing/2010/main" xmlns="" w="9525">
                   <a:solidFill>
                     <a:srgbClr val="000000"/>
                   </a:solidFill>
@@ -4426,7 +4415,7 @@
             </a:ln>
             <a:extLst>
               <a:ext uri="{91240B29-F687-4f45-9708-019B960494DF}">
-                <a14:hiddenLine xmlns="" xmlns:a14="http://schemas.microsoft.com/office/drawing/2010/main" w="9525">
+                <a14:hiddenLine xmlns:a14="http://schemas.microsoft.com/office/drawing/2010/main" xmlns="" w="9525">
                   <a:solidFill>
                     <a:srgbClr val="000000"/>
                   </a:solidFill>
@@ -4516,7 +4505,7 @@
             </a:ln>
             <a:extLst>
               <a:ext uri="{91240B29-F687-4f45-9708-019B960494DF}">
-                <a14:hiddenLine xmlns="" xmlns:a14="http://schemas.microsoft.com/office/drawing/2010/main" w="9525">
+                <a14:hiddenLine xmlns:a14="http://schemas.microsoft.com/office/drawing/2010/main" xmlns="" w="9525">
                   <a:solidFill>
                     <a:srgbClr val="000000"/>
                   </a:solidFill>
@@ -4606,7 +4595,7 @@
             </a:ln>
             <a:extLst>
               <a:ext uri="{91240B29-F687-4f45-9708-019B960494DF}">
-                <a14:hiddenLine xmlns="" xmlns:a14="http://schemas.microsoft.com/office/drawing/2010/main" w="9525">
+                <a14:hiddenLine xmlns:a14="http://schemas.microsoft.com/office/drawing/2010/main" xmlns="" w="9525">
                   <a:solidFill>
                     <a:srgbClr val="000000"/>
                   </a:solidFill>
@@ -4668,7 +4657,7 @@
             </a:ln>
             <a:extLst>
               <a:ext uri="{91240B29-F687-4f45-9708-019B960494DF}">
-                <a14:hiddenLine xmlns="" xmlns:a14="http://schemas.microsoft.com/office/drawing/2010/main" w="9525">
+                <a14:hiddenLine xmlns:a14="http://schemas.microsoft.com/office/drawing/2010/main" xmlns="" w="9525">
                   <a:solidFill>
                     <a:srgbClr val="000000"/>
                   </a:solidFill>
@@ -4778,7 +4767,7 @@
             </a:ln>
             <a:extLst>
               <a:ext uri="{91240B29-F687-4f45-9708-019B960494DF}">
-                <a14:hiddenLine xmlns="" xmlns:a14="http://schemas.microsoft.com/office/drawing/2010/main" w="9525">
+                <a14:hiddenLine xmlns:a14="http://schemas.microsoft.com/office/drawing/2010/main" xmlns="" w="9525">
                   <a:solidFill>
                     <a:srgbClr val="000000"/>
                   </a:solidFill>
@@ -4840,7 +4829,7 @@
             </a:ln>
             <a:extLst>
               <a:ext uri="{91240B29-F687-4f45-9708-019B960494DF}">
-                <a14:hiddenLine xmlns="" xmlns:a14="http://schemas.microsoft.com/office/drawing/2010/main" w="9525">
+                <a14:hiddenLine xmlns:a14="http://schemas.microsoft.com/office/drawing/2010/main" xmlns="" w="9525">
                   <a:solidFill>
                     <a:srgbClr val="000000"/>
                   </a:solidFill>
@@ -4930,7 +4919,7 @@
             </a:ln>
             <a:extLst>
               <a:ext uri="{91240B29-F687-4f45-9708-019B960494DF}">
-                <a14:hiddenLine xmlns="" xmlns:a14="http://schemas.microsoft.com/office/drawing/2010/main" w="9525">
+                <a14:hiddenLine xmlns:a14="http://schemas.microsoft.com/office/drawing/2010/main" xmlns="" w="9525">
                   <a:solidFill>
                     <a:srgbClr val="000000"/>
                   </a:solidFill>
@@ -5020,7 +5009,7 @@
             </a:ln>
             <a:extLst>
               <a:ext uri="{91240B29-F687-4f45-9708-019B960494DF}">
-                <a14:hiddenLine xmlns="" xmlns:a14="http://schemas.microsoft.com/office/drawing/2010/main" w="9525">
+                <a14:hiddenLine xmlns:a14="http://schemas.microsoft.com/office/drawing/2010/main" xmlns="" w="9525">
                   <a:solidFill>
                     <a:srgbClr val="000000"/>
                   </a:solidFill>
@@ -5082,7 +5071,7 @@
             </a:ln>
             <a:extLst>
               <a:ext uri="{91240B29-F687-4f45-9708-019B960494DF}">
-                <a14:hiddenLine xmlns="" xmlns:a14="http://schemas.microsoft.com/office/drawing/2010/main" w="9525">
+                <a14:hiddenLine xmlns:a14="http://schemas.microsoft.com/office/drawing/2010/main" xmlns="" w="9525">
                   <a:solidFill>
                     <a:srgbClr val="000000"/>
                   </a:solidFill>
@@ -5172,7 +5161,7 @@
             </a:ln>
             <a:extLst>
               <a:ext uri="{91240B29-F687-4f45-9708-019B960494DF}">
-                <a14:hiddenLine xmlns="" xmlns:a14="http://schemas.microsoft.com/office/drawing/2010/main" w="9525">
+                <a14:hiddenLine xmlns:a14="http://schemas.microsoft.com/office/drawing/2010/main" xmlns="" w="9525">
                   <a:solidFill>
                     <a:srgbClr val="000000"/>
                   </a:solidFill>
@@ -5262,7 +5251,7 @@
             </a:ln>
             <a:extLst>
               <a:ext uri="{91240B29-F687-4f45-9708-019B960494DF}">
-                <a14:hiddenLine xmlns="" xmlns:a14="http://schemas.microsoft.com/office/drawing/2010/main" w="9525">
+                <a14:hiddenLine xmlns:a14="http://schemas.microsoft.com/office/drawing/2010/main" xmlns="" w="9525">
                   <a:solidFill>
                     <a:srgbClr val="000000"/>
                   </a:solidFill>
@@ -5318,7 +5307,7 @@
             </a:ln>
             <a:extLst>
               <a:ext uri="{91240B29-F687-4f45-9708-019B960494DF}">
-                <a14:hiddenLine xmlns="" xmlns:a14="http://schemas.microsoft.com/office/drawing/2010/main" w="9525">
+                <a14:hiddenLine xmlns:a14="http://schemas.microsoft.com/office/drawing/2010/main" xmlns="" w="9525">
                   <a:solidFill>
                     <a:srgbClr val="000000"/>
                   </a:solidFill>
@@ -5408,7 +5397,7 @@
             </a:ln>
             <a:extLst>
               <a:ext uri="{91240B29-F687-4f45-9708-019B960494DF}">
-                <a14:hiddenLine xmlns="" xmlns:a14="http://schemas.microsoft.com/office/drawing/2010/main" w="9525">
+                <a14:hiddenLine xmlns:a14="http://schemas.microsoft.com/office/drawing/2010/main" xmlns="" w="9525">
                   <a:solidFill>
                     <a:srgbClr val="000000"/>
                   </a:solidFill>
@@ -5464,7 +5453,7 @@
             </a:ln>
             <a:extLst>
               <a:ext uri="{91240B29-F687-4f45-9708-019B960494DF}">
-                <a14:hiddenLine xmlns="" xmlns:a14="http://schemas.microsoft.com/office/drawing/2010/main" w="9525">
+                <a14:hiddenLine xmlns:a14="http://schemas.microsoft.com/office/drawing/2010/main" xmlns="" w="9525">
                   <a:solidFill>
                     <a:srgbClr val="000000"/>
                   </a:solidFill>
@@ -5554,7 +5543,7 @@
             </a:ln>
             <a:extLst>
               <a:ext uri="{91240B29-F687-4f45-9708-019B960494DF}">
-                <a14:hiddenLine xmlns="" xmlns:a14="http://schemas.microsoft.com/office/drawing/2010/main" w="9525">
+                <a14:hiddenLine xmlns:a14="http://schemas.microsoft.com/office/drawing/2010/main" xmlns="" w="9525">
                   <a:solidFill>
                     <a:srgbClr val="000000"/>
                   </a:solidFill>
@@ -5622,7 +5611,7 @@
             </a:ln>
             <a:extLst>
               <a:ext uri="{91240B29-F687-4f45-9708-019B960494DF}">
-                <a14:hiddenLine xmlns="" xmlns:a14="http://schemas.microsoft.com/office/drawing/2010/main" w="9525">
+                <a14:hiddenLine xmlns:a14="http://schemas.microsoft.com/office/drawing/2010/main" xmlns="" w="9525">
                   <a:solidFill>
                     <a:srgbClr val="000000"/>
                   </a:solidFill>
@@ -5712,7 +5701,7 @@
             </a:ln>
             <a:extLst>
               <a:ext uri="{91240B29-F687-4f45-9708-019B960494DF}">
-                <a14:hiddenLine xmlns="" xmlns:a14="http://schemas.microsoft.com/office/drawing/2010/main" w="9525">
+                <a14:hiddenLine xmlns:a14="http://schemas.microsoft.com/office/drawing/2010/main" xmlns="" w="9525">
                   <a:solidFill>
                     <a:srgbClr val="000000"/>
                   </a:solidFill>
@@ -5780,7 +5769,7 @@
             </a:ln>
             <a:extLst>
               <a:ext uri="{91240B29-F687-4f45-9708-019B960494DF}">
-                <a14:hiddenLine xmlns="" xmlns:a14="http://schemas.microsoft.com/office/drawing/2010/main" w="9525">
+                <a14:hiddenLine xmlns:a14="http://schemas.microsoft.com/office/drawing/2010/main" xmlns="" w="9525">
                   <a:solidFill>
                     <a:srgbClr val="000000"/>
                   </a:solidFill>
@@ -5870,7 +5859,7 @@
             </a:ln>
             <a:extLst>
               <a:ext uri="{91240B29-F687-4f45-9708-019B960494DF}">
-                <a14:hiddenLine xmlns="" xmlns:a14="http://schemas.microsoft.com/office/drawing/2010/main" w="9525">
+                <a14:hiddenLine xmlns:a14="http://schemas.microsoft.com/office/drawing/2010/main" xmlns="" w="9525">
                   <a:solidFill>
                     <a:srgbClr val="000000"/>
                   </a:solidFill>
@@ -5904,7 +5893,7 @@
             </a:ln>
             <a:extLst>
               <a:ext uri="{91240B29-F687-4f45-9708-019B960494DF}">
-                <a14:hiddenLine xmlns="" xmlns:a14="http://schemas.microsoft.com/office/drawing/2010/main" w="9525">
+                <a14:hiddenLine xmlns:a14="http://schemas.microsoft.com/office/drawing/2010/main" xmlns="" w="9525">
                   <a:solidFill>
                     <a:srgbClr val="000000"/>
                   </a:solidFill>
@@ -5994,7 +5983,7 @@
             </a:ln>
             <a:extLst>
               <a:ext uri="{91240B29-F687-4f45-9708-019B960494DF}">
-                <a14:hiddenLine xmlns="" xmlns:a14="http://schemas.microsoft.com/office/drawing/2010/main" w="9525">
+                <a14:hiddenLine xmlns:a14="http://schemas.microsoft.com/office/drawing/2010/main" xmlns="" w="9525">
                   <a:solidFill>
                     <a:srgbClr val="000000"/>
                   </a:solidFill>
@@ -6056,7 +6045,7 @@
             </a:ln>
             <a:extLst>
               <a:ext uri="{91240B29-F687-4f45-9708-019B960494DF}">
-                <a14:hiddenLine xmlns="" xmlns:a14="http://schemas.microsoft.com/office/drawing/2010/main" w="9525">
+                <a14:hiddenLine xmlns:a14="http://schemas.microsoft.com/office/drawing/2010/main" xmlns="" w="9525">
                   <a:solidFill>
                     <a:srgbClr val="000000"/>
                   </a:solidFill>
@@ -6118,7 +6107,7 @@
             </a:ln>
             <a:extLst>
               <a:ext uri="{91240B29-F687-4f45-9708-019B960494DF}">
-                <a14:hiddenLine xmlns="" xmlns:a14="http://schemas.microsoft.com/office/drawing/2010/main" w="9525">
+                <a14:hiddenLine xmlns:a14="http://schemas.microsoft.com/office/drawing/2010/main" xmlns="" w="9525">
                   <a:solidFill>
                     <a:srgbClr val="000000"/>
                   </a:solidFill>
@@ -6208,7 +6197,7 @@
             </a:ln>
             <a:extLst>
               <a:ext uri="{91240B29-F687-4f45-9708-019B960494DF}">
-                <a14:hiddenLine xmlns="" xmlns:a14="http://schemas.microsoft.com/office/drawing/2010/main" w="9525">
+                <a14:hiddenLine xmlns:a14="http://schemas.microsoft.com/office/drawing/2010/main" xmlns="" w="9525">
                   <a:solidFill>
                     <a:srgbClr val="000000"/>
                   </a:solidFill>
@@ -6276,7 +6265,7 @@
             </a:ln>
             <a:extLst>
               <a:ext uri="{91240B29-F687-4f45-9708-019B960494DF}">
-                <a14:hiddenLine xmlns="" xmlns:a14="http://schemas.microsoft.com/office/drawing/2010/main" w="9525">
+                <a14:hiddenLine xmlns:a14="http://schemas.microsoft.com/office/drawing/2010/main" xmlns="" w="9525">
                   <a:solidFill>
                     <a:srgbClr val="000000"/>
                   </a:solidFill>
@@ -6338,7 +6327,7 @@
             </a:ln>
             <a:extLst>
               <a:ext uri="{91240B29-F687-4f45-9708-019B960494DF}">
-                <a14:hiddenLine xmlns="" xmlns:a14="http://schemas.microsoft.com/office/drawing/2010/main" w="9525">
+                <a14:hiddenLine xmlns:a14="http://schemas.microsoft.com/office/drawing/2010/main" xmlns="" w="9525">
                   <a:solidFill>
                     <a:srgbClr val="000000"/>
                   </a:solidFill>
@@ -6428,7 +6417,7 @@
             </a:ln>
             <a:extLst>
               <a:ext uri="{91240B29-F687-4f45-9708-019B960494DF}">
-                <a14:hiddenLine xmlns="" xmlns:a14="http://schemas.microsoft.com/office/drawing/2010/main" w="9525">
+                <a14:hiddenLine xmlns:a14="http://schemas.microsoft.com/office/drawing/2010/main" xmlns="" w="9525">
                   <a:solidFill>
                     <a:srgbClr val="000000"/>
                   </a:solidFill>
@@ -6490,7 +6479,7 @@
             </a:ln>
             <a:extLst>
               <a:ext uri="{91240B29-F687-4f45-9708-019B960494DF}">
-                <a14:hiddenLine xmlns="" xmlns:a14="http://schemas.microsoft.com/office/drawing/2010/main" w="9525">
+                <a14:hiddenLine xmlns:a14="http://schemas.microsoft.com/office/drawing/2010/main" xmlns="" w="9525">
                   <a:solidFill>
                     <a:srgbClr val="000000"/>
                   </a:solidFill>
@@ -6580,7 +6569,7 @@
             </a:ln>
             <a:extLst>
               <a:ext uri="{91240B29-F687-4f45-9708-019B960494DF}">
-                <a14:hiddenLine xmlns="" xmlns:a14="http://schemas.microsoft.com/office/drawing/2010/main" w="9525">
+                <a14:hiddenLine xmlns:a14="http://schemas.microsoft.com/office/drawing/2010/main" xmlns="" w="9525">
                   <a:solidFill>
                     <a:srgbClr val="000000"/>
                   </a:solidFill>
@@ -6642,7 +6631,7 @@
             </a:ln>
             <a:extLst>
               <a:ext uri="{91240B29-F687-4f45-9708-019B960494DF}">
-                <a14:hiddenLine xmlns="" xmlns:a14="http://schemas.microsoft.com/office/drawing/2010/main" w="9525">
+                <a14:hiddenLine xmlns:a14="http://schemas.microsoft.com/office/drawing/2010/main" xmlns="" w="9525">
                   <a:solidFill>
                     <a:srgbClr val="000000"/>
                   </a:solidFill>
@@ -6732,7 +6721,7 @@
             </a:ln>
             <a:extLst>
               <a:ext uri="{91240B29-F687-4f45-9708-019B960494DF}">
-                <a14:hiddenLine xmlns="" xmlns:a14="http://schemas.microsoft.com/office/drawing/2010/main" w="9525">
+                <a14:hiddenLine xmlns:a14="http://schemas.microsoft.com/office/drawing/2010/main" xmlns="" w="9525">
                   <a:solidFill>
                     <a:srgbClr val="000000"/>
                   </a:solidFill>
@@ -6766,7 +6755,7 @@
             </a:ln>
             <a:extLst>
               <a:ext uri="{91240B29-F687-4f45-9708-019B960494DF}">
-                <a14:hiddenLine xmlns="" xmlns:a14="http://schemas.microsoft.com/office/drawing/2010/main" w="9525">
+                <a14:hiddenLine xmlns:a14="http://schemas.microsoft.com/office/drawing/2010/main" xmlns="" w="9525">
                   <a:solidFill>
                     <a:srgbClr val="000000"/>
                   </a:solidFill>
@@ -6831,7 +6820,7 @@
             </a:ln>
             <a:extLst>
               <a:ext uri="{91240B29-F687-4f45-9708-019B960494DF}">
-                <a14:hiddenLine xmlns="" xmlns:a14="http://schemas.microsoft.com/office/drawing/2010/main" w="9525">
+                <a14:hiddenLine xmlns:a14="http://schemas.microsoft.com/office/drawing/2010/main" xmlns="" w="9525">
                   <a:solidFill>
                     <a:srgbClr val="000000"/>
                   </a:solidFill>
@@ -6921,7 +6910,7 @@
             </a:ln>
             <a:extLst>
               <a:ext uri="{91240B29-F687-4f45-9708-019B960494DF}">
-                <a14:hiddenLine xmlns="" xmlns:a14="http://schemas.microsoft.com/office/drawing/2010/main" w="9525">
+                <a14:hiddenLine xmlns:a14="http://schemas.microsoft.com/office/drawing/2010/main" xmlns="" w="9525">
                   <a:solidFill>
                     <a:srgbClr val="000000"/>
                   </a:solidFill>
@@ -6983,7 +6972,7 @@
             </a:ln>
             <a:extLst>
               <a:ext uri="{91240B29-F687-4f45-9708-019B960494DF}">
-                <a14:hiddenLine xmlns="" xmlns:a14="http://schemas.microsoft.com/office/drawing/2010/main" w="9525">
+                <a14:hiddenLine xmlns:a14="http://schemas.microsoft.com/office/drawing/2010/main" xmlns="" w="9525">
                   <a:solidFill>
                     <a:srgbClr val="000000"/>
                   </a:solidFill>
@@ -7073,7 +7062,7 @@
             </a:ln>
             <a:extLst>
               <a:ext uri="{91240B29-F687-4f45-9708-019B960494DF}">
-                <a14:hiddenLine xmlns="" xmlns:a14="http://schemas.microsoft.com/office/drawing/2010/main" w="9525">
+                <a14:hiddenLine xmlns:a14="http://schemas.microsoft.com/office/drawing/2010/main" xmlns="" w="9525">
                   <a:solidFill>
                     <a:srgbClr val="000000"/>
                   </a:solidFill>
@@ -7163,7 +7152,7 @@
             </a:ln>
             <a:extLst>
               <a:ext uri="{91240B29-F687-4f45-9708-019B960494DF}">
-                <a14:hiddenLine xmlns="" xmlns:a14="http://schemas.microsoft.com/office/drawing/2010/main" w="9525">
+                <a14:hiddenLine xmlns:a14="http://schemas.microsoft.com/office/drawing/2010/main" xmlns="" w="9525">
                   <a:solidFill>
                     <a:srgbClr val="000000"/>
                   </a:solidFill>
@@ -7228,7 +7217,7 @@
             </a:ln>
             <a:extLst>
               <a:ext uri="{91240B29-F687-4f45-9708-019B960494DF}">
-                <a14:hiddenLine xmlns="" xmlns:a14="http://schemas.microsoft.com/office/drawing/2010/main" w="9525">
+                <a14:hiddenLine xmlns:a14="http://schemas.microsoft.com/office/drawing/2010/main" xmlns="" w="9525">
                   <a:solidFill>
                     <a:srgbClr val="000000"/>
                   </a:solidFill>
@@ -7290,7 +7279,7 @@
             </a:ln>
             <a:extLst>
               <a:ext uri="{91240B29-F687-4f45-9708-019B960494DF}">
-                <a14:hiddenLine xmlns="" xmlns:a14="http://schemas.microsoft.com/office/drawing/2010/main" w="9525">
+                <a14:hiddenLine xmlns:a14="http://schemas.microsoft.com/office/drawing/2010/main" xmlns="" w="9525">
                   <a:solidFill>
                     <a:srgbClr val="000000"/>
                   </a:solidFill>
@@ -7380,7 +7369,7 @@
             </a:ln>
             <a:extLst>
               <a:ext uri="{91240B29-F687-4f45-9708-019B960494DF}">
-                <a14:hiddenLine xmlns="" xmlns:a14="http://schemas.microsoft.com/office/drawing/2010/main" w="9525">
+                <a14:hiddenLine xmlns:a14="http://schemas.microsoft.com/office/drawing/2010/main" xmlns="" w="9525">
                   <a:solidFill>
                     <a:srgbClr val="000000"/>
                   </a:solidFill>
@@ -7470,7 +7459,7 @@
             </a:ln>
             <a:extLst>
               <a:ext uri="{91240B29-F687-4f45-9708-019B960494DF}">
-                <a14:hiddenLine xmlns="" xmlns:a14="http://schemas.microsoft.com/office/drawing/2010/main" w="9525">
+                <a14:hiddenLine xmlns:a14="http://schemas.microsoft.com/office/drawing/2010/main" xmlns="" w="9525">
                   <a:solidFill>
                     <a:srgbClr val="000000"/>
                   </a:solidFill>
@@ -7532,7 +7521,7 @@
             </a:ln>
             <a:extLst>
               <a:ext uri="{91240B29-F687-4f45-9708-019B960494DF}">
-                <a14:hiddenLine xmlns="" xmlns:a14="http://schemas.microsoft.com/office/drawing/2010/main" w="9525">
+                <a14:hiddenLine xmlns:a14="http://schemas.microsoft.com/office/drawing/2010/main" xmlns="" w="9525">
                   <a:solidFill>
                     <a:srgbClr val="000000"/>
                   </a:solidFill>
@@ -7652,7 +7641,7 @@
             </a:ln>
             <a:extLst>
               <a:ext uri="{91240B29-F687-4f45-9708-019B960494DF}">
-                <a14:hiddenLine xmlns="" xmlns:a14="http://schemas.microsoft.com/office/drawing/2010/main" w="9525">
+                <a14:hiddenLine xmlns:a14="http://schemas.microsoft.com/office/drawing/2010/main" xmlns="" w="9525">
                   <a:solidFill>
                     <a:srgbClr val="000000"/>
                   </a:solidFill>
@@ -7720,7 +7709,7 @@
             </a:ln>
             <a:extLst>
               <a:ext uri="{91240B29-F687-4f45-9708-019B960494DF}">
-                <a14:hiddenLine xmlns="" xmlns:a14="http://schemas.microsoft.com/office/drawing/2010/main" w="9525">
+                <a14:hiddenLine xmlns:a14="http://schemas.microsoft.com/office/drawing/2010/main" xmlns="" w="9525">
                   <a:solidFill>
                     <a:srgbClr val="000000"/>
                   </a:solidFill>
@@ -7810,7 +7799,7 @@
             </a:ln>
             <a:extLst>
               <a:ext uri="{91240B29-F687-4f45-9708-019B960494DF}">
-                <a14:hiddenLine xmlns="" xmlns:a14="http://schemas.microsoft.com/office/drawing/2010/main" w="9525">
+                <a14:hiddenLine xmlns:a14="http://schemas.microsoft.com/office/drawing/2010/main" xmlns="" w="9525">
                   <a:solidFill>
                     <a:srgbClr val="000000"/>
                   </a:solidFill>
@@ -7950,7 +7939,7 @@
           <a:p>
             <a:fld id="{48A87A34-81AB-432B-8DAE-1953F412C126}" type="datetimeFigureOut">
               <a:rPr lang="en-US" dirty="0"/>
-              <a:t>4/7/18</a:t>
+              <a:t>4/9/2018</a:t>
             </a:fld>
             <a:endParaRPr lang="en-US" dirty="0"/>
           </a:p>
@@ -8212,7 +8201,7 @@
           <a:p>
             <a:fld id="{48A87A34-81AB-432B-8DAE-1953F412C126}" type="datetimeFigureOut">
               <a:rPr lang="en-US" dirty="0"/>
-              <a:t>4/7/18</a:t>
+              <a:t>4/9/2018</a:t>
             </a:fld>
             <a:endParaRPr lang="en-US" dirty="0"/>
           </a:p>
@@ -8403,7 +8392,7 @@
           <a:p>
             <a:fld id="{48A87A34-81AB-432B-8DAE-1953F412C126}" type="datetimeFigureOut">
               <a:rPr lang="en-US" dirty="0"/>
-              <a:t>4/7/18</a:t>
+              <a:t>4/9/2018</a:t>
             </a:fld>
             <a:endParaRPr lang="en-US" dirty="0"/>
           </a:p>
@@ -8661,7 +8650,7 @@
           <a:p>
             <a:fld id="{48A87A34-81AB-432B-8DAE-1953F412C126}" type="datetimeFigureOut">
               <a:rPr lang="en-US" dirty="0"/>
-              <a:t>4/7/18</a:t>
+              <a:t>4/9/2018</a:t>
             </a:fld>
             <a:endParaRPr lang="en-US" dirty="0"/>
           </a:p>
@@ -9090,7 +9079,7 @@
           <a:p>
             <a:fld id="{48A87A34-81AB-432B-8DAE-1953F412C126}" type="datetimeFigureOut">
               <a:rPr lang="en-US" dirty="0"/>
-              <a:t>4/7/18</a:t>
+              <a:t>4/9/2018</a:t>
             </a:fld>
             <a:endParaRPr lang="en-US" dirty="0"/>
           </a:p>
@@ -9631,7 +9620,7 @@
           <a:p>
             <a:fld id="{48A87A34-81AB-432B-8DAE-1953F412C126}" type="datetimeFigureOut">
               <a:rPr lang="en-US" dirty="0"/>
-              <a:t>4/7/18</a:t>
+              <a:t>4/9/2018</a:t>
             </a:fld>
             <a:endParaRPr lang="en-US" dirty="0"/>
           </a:p>
@@ -10346,7 +10335,7 @@
           <a:p>
             <a:fld id="{48A87A34-81AB-432B-8DAE-1953F412C126}" type="datetimeFigureOut">
               <a:rPr lang="en-US" dirty="0"/>
-              <a:t>4/7/18</a:t>
+              <a:t>4/9/2018</a:t>
             </a:fld>
             <a:endParaRPr lang="en-US" dirty="0"/>
           </a:p>
@@ -10511,7 +10500,7 @@
           <a:p>
             <a:fld id="{48A87A34-81AB-432B-8DAE-1953F412C126}" type="datetimeFigureOut">
               <a:rPr lang="en-US" dirty="0"/>
-              <a:t>4/7/18</a:t>
+              <a:t>4/9/2018</a:t>
             </a:fld>
             <a:endParaRPr lang="en-US" dirty="0"/>
           </a:p>
@@ -10686,7 +10675,7 @@
           <a:p>
             <a:fld id="{48A87A34-81AB-432B-8DAE-1953F412C126}" type="datetimeFigureOut">
               <a:rPr lang="en-US" dirty="0"/>
-              <a:t>4/7/18</a:t>
+              <a:t>4/9/2018</a:t>
             </a:fld>
             <a:endParaRPr lang="en-US" dirty="0"/>
           </a:p>
@@ -10851,7 +10840,7 @@
           <a:p>
             <a:fld id="{48A87A34-81AB-432B-8DAE-1953F412C126}" type="datetimeFigureOut">
               <a:rPr lang="en-US" dirty="0"/>
-              <a:t>4/7/18</a:t>
+              <a:t>4/9/2018</a:t>
             </a:fld>
             <a:endParaRPr lang="en-US" dirty="0"/>
           </a:p>
@@ -11096,7 +11085,7 @@
           <a:p>
             <a:fld id="{48A87A34-81AB-432B-8DAE-1953F412C126}" type="datetimeFigureOut">
               <a:rPr lang="en-US" dirty="0"/>
-              <a:t>4/7/18</a:t>
+              <a:t>4/9/2018</a:t>
             </a:fld>
             <a:endParaRPr lang="en-US" dirty="0"/>
           </a:p>
@@ -11323,7 +11312,7 @@
           <a:p>
             <a:fld id="{48A87A34-81AB-432B-8DAE-1953F412C126}" type="datetimeFigureOut">
               <a:rPr lang="en-US" dirty="0"/>
-              <a:t>4/7/18</a:t>
+              <a:t>4/9/2018</a:t>
             </a:fld>
             <a:endParaRPr lang="en-US" dirty="0"/>
           </a:p>
@@ -11699,7 +11688,7 @@
           <a:p>
             <a:fld id="{48A87A34-81AB-432B-8DAE-1953F412C126}" type="datetimeFigureOut">
               <a:rPr lang="en-US" dirty="0"/>
-              <a:t>4/7/18</a:t>
+              <a:t>4/9/2018</a:t>
             </a:fld>
             <a:endParaRPr lang="en-US" dirty="0"/>
           </a:p>
@@ -11812,7 +11801,7 @@
           <a:p>
             <a:fld id="{48A87A34-81AB-432B-8DAE-1953F412C126}" type="datetimeFigureOut">
               <a:rPr lang="en-US" dirty="0"/>
-              <a:t>4/7/18</a:t>
+              <a:t>4/9/2018</a:t>
             </a:fld>
             <a:endParaRPr lang="en-US" dirty="0"/>
           </a:p>
@@ -11902,7 +11891,7 @@
           <a:p>
             <a:fld id="{48A87A34-81AB-432B-8DAE-1953F412C126}" type="datetimeFigureOut">
               <a:rPr lang="en-US" dirty="0"/>
-              <a:t>4/7/18</a:t>
+              <a:t>4/9/2018</a:t>
             </a:fld>
             <a:endParaRPr lang="en-US" dirty="0"/>
           </a:p>
@@ -12146,7 +12135,7 @@
           <a:p>
             <a:fld id="{48A87A34-81AB-432B-8DAE-1953F412C126}" type="datetimeFigureOut">
               <a:rPr lang="en-US" dirty="0"/>
-              <a:t>4/7/18</a:t>
+              <a:t>4/9/2018</a:t>
             </a:fld>
             <a:endParaRPr lang="en-US" dirty="0"/>
           </a:p>
@@ -12421,7 +12410,7 @@
           <a:p>
             <a:fld id="{48A87A34-81AB-432B-8DAE-1953F412C126}" type="datetimeFigureOut">
               <a:rPr lang="en-US" dirty="0"/>
-              <a:t>4/7/18</a:t>
+              <a:t>4/9/2018</a:t>
             </a:fld>
             <a:endParaRPr lang="en-US" dirty="0"/>
           </a:p>
@@ -12539,7 +12528,7 @@
           <a:noFill/>
           <a:extLst>
             <a:ext uri="{909E8E84-426E-40dd-AFC4-6F175D3DCCD1}">
-              <a14:hiddenFill xmlns="" xmlns:a14="http://schemas.microsoft.com/office/drawing/2010/main">
+              <a14:hiddenFill xmlns:a14="http://schemas.microsoft.com/office/drawing/2010/main" xmlns="">
                 <a:solidFill>
                   <a:srgbClr val="FFFFFF"/>
                 </a:solidFill>
@@ -12613,7 +12602,7 @@
               </a:ln>
               <a:extLst>
                 <a:ext uri="{91240B29-F687-4f45-9708-019B960494DF}">
-                  <a14:hiddenLine xmlns="" xmlns:a14="http://schemas.microsoft.com/office/drawing/2010/main" w="9525">
+                  <a14:hiddenLine xmlns:a14="http://schemas.microsoft.com/office/drawing/2010/main" xmlns="" w="9525">
                     <a:solidFill>
                       <a:srgbClr val="000000"/>
                     </a:solidFill>
@@ -12703,7 +12692,7 @@
               </a:ln>
               <a:extLst>
                 <a:ext uri="{91240B29-F687-4f45-9708-019B960494DF}">
-                  <a14:hiddenLine xmlns="" xmlns:a14="http://schemas.microsoft.com/office/drawing/2010/main" w="9525">
+                  <a14:hiddenLine xmlns:a14="http://schemas.microsoft.com/office/drawing/2010/main" xmlns="" w="9525">
                     <a:solidFill>
                       <a:srgbClr val="000000"/>
                     </a:solidFill>
@@ -12793,7 +12782,7 @@
               </a:ln>
               <a:extLst>
                 <a:ext uri="{91240B29-F687-4f45-9708-019B960494DF}">
-                  <a14:hiddenLine xmlns="" xmlns:a14="http://schemas.microsoft.com/office/drawing/2010/main" w="9525">
+                  <a14:hiddenLine xmlns:a14="http://schemas.microsoft.com/office/drawing/2010/main" xmlns="" w="9525">
                     <a:solidFill>
                       <a:srgbClr val="000000"/>
                     </a:solidFill>
@@ -12855,7 +12844,7 @@
               </a:ln>
               <a:extLst>
                 <a:ext uri="{91240B29-F687-4f45-9708-019B960494DF}">
-                  <a14:hiddenLine xmlns="" xmlns:a14="http://schemas.microsoft.com/office/drawing/2010/main" w="9525">
+                  <a14:hiddenLine xmlns:a14="http://schemas.microsoft.com/office/drawing/2010/main" xmlns="" w="9525">
                     <a:solidFill>
                       <a:srgbClr val="000000"/>
                     </a:solidFill>
@@ -12945,7 +12934,7 @@
               </a:ln>
               <a:extLst>
                 <a:ext uri="{91240B29-F687-4f45-9708-019B960494DF}">
-                  <a14:hiddenLine xmlns="" xmlns:a14="http://schemas.microsoft.com/office/drawing/2010/main" w="9525">
+                  <a14:hiddenLine xmlns:a14="http://schemas.microsoft.com/office/drawing/2010/main" xmlns="" w="9525">
                     <a:solidFill>
                       <a:srgbClr val="000000"/>
                     </a:solidFill>
@@ -13007,7 +12996,7 @@
               </a:ln>
               <a:extLst>
                 <a:ext uri="{91240B29-F687-4f45-9708-019B960494DF}">
-                  <a14:hiddenLine xmlns="" xmlns:a14="http://schemas.microsoft.com/office/drawing/2010/main" w="9525">
+                  <a14:hiddenLine xmlns:a14="http://schemas.microsoft.com/office/drawing/2010/main" xmlns="" w="9525">
                     <a:solidFill>
                       <a:srgbClr val="000000"/>
                     </a:solidFill>
@@ -13069,7 +13058,7 @@
               </a:ln>
               <a:extLst>
                 <a:ext uri="{91240B29-F687-4f45-9708-019B960494DF}">
-                  <a14:hiddenLine xmlns="" xmlns:a14="http://schemas.microsoft.com/office/drawing/2010/main" w="9525">
+                  <a14:hiddenLine xmlns:a14="http://schemas.microsoft.com/office/drawing/2010/main" xmlns="" w="9525">
                     <a:solidFill>
                       <a:srgbClr val="000000"/>
                     </a:solidFill>
@@ -13159,7 +13148,7 @@
               </a:ln>
               <a:extLst>
                 <a:ext uri="{91240B29-F687-4f45-9708-019B960494DF}">
-                  <a14:hiddenLine xmlns="" xmlns:a14="http://schemas.microsoft.com/office/drawing/2010/main" w="9525">
+                  <a14:hiddenLine xmlns:a14="http://schemas.microsoft.com/office/drawing/2010/main" xmlns="" w="9525">
                     <a:solidFill>
                       <a:srgbClr val="000000"/>
                     </a:solidFill>
@@ -13249,7 +13238,7 @@
               </a:ln>
               <a:extLst>
                 <a:ext uri="{91240B29-F687-4f45-9708-019B960494DF}">
-                  <a14:hiddenLine xmlns="" xmlns:a14="http://schemas.microsoft.com/office/drawing/2010/main" w="9525">
+                  <a14:hiddenLine xmlns:a14="http://schemas.microsoft.com/office/drawing/2010/main" xmlns="" w="9525">
                     <a:solidFill>
                       <a:srgbClr val="000000"/>
                     </a:solidFill>
@@ -13311,7 +13300,7 @@
               </a:ln>
               <a:extLst>
                 <a:ext uri="{91240B29-F687-4f45-9708-019B960494DF}">
-                  <a14:hiddenLine xmlns="" xmlns:a14="http://schemas.microsoft.com/office/drawing/2010/main" w="9525">
+                  <a14:hiddenLine xmlns:a14="http://schemas.microsoft.com/office/drawing/2010/main" xmlns="" w="9525">
                     <a:solidFill>
                       <a:srgbClr val="000000"/>
                     </a:solidFill>
@@ -13421,7 +13410,7 @@
               </a:ln>
               <a:extLst>
                 <a:ext uri="{91240B29-F687-4f45-9708-019B960494DF}">
-                  <a14:hiddenLine xmlns="" xmlns:a14="http://schemas.microsoft.com/office/drawing/2010/main" w="9525">
+                  <a14:hiddenLine xmlns:a14="http://schemas.microsoft.com/office/drawing/2010/main" xmlns="" w="9525">
                     <a:solidFill>
                       <a:srgbClr val="000000"/>
                     </a:solidFill>
@@ -13505,7 +13494,7 @@
               </a:ln>
               <a:extLst>
                 <a:ext uri="{91240B29-F687-4f45-9708-019B960494DF}">
-                  <a14:hiddenLine xmlns="" xmlns:a14="http://schemas.microsoft.com/office/drawing/2010/main" w="9525">
+                  <a14:hiddenLine xmlns:a14="http://schemas.microsoft.com/office/drawing/2010/main" xmlns="" w="9525">
                     <a:solidFill>
                       <a:srgbClr val="000000"/>
                     </a:solidFill>
@@ -13567,7 +13556,7 @@
               </a:ln>
               <a:extLst>
                 <a:ext uri="{91240B29-F687-4f45-9708-019B960494DF}">
-                  <a14:hiddenLine xmlns="" xmlns:a14="http://schemas.microsoft.com/office/drawing/2010/main" w="9525">
+                  <a14:hiddenLine xmlns:a14="http://schemas.microsoft.com/office/drawing/2010/main" xmlns="" w="9525">
                     <a:solidFill>
                       <a:srgbClr val="000000"/>
                     </a:solidFill>
@@ -13629,7 +13618,7 @@
               </a:ln>
               <a:extLst>
                 <a:ext uri="{91240B29-F687-4f45-9708-019B960494DF}">
-                  <a14:hiddenLine xmlns="" xmlns:a14="http://schemas.microsoft.com/office/drawing/2010/main" w="9525">
+                  <a14:hiddenLine xmlns:a14="http://schemas.microsoft.com/office/drawing/2010/main" xmlns="" w="9525">
                     <a:solidFill>
                       <a:srgbClr val="000000"/>
                     </a:solidFill>
@@ -13719,7 +13708,7 @@
               </a:ln>
               <a:extLst>
                 <a:ext uri="{91240B29-F687-4f45-9708-019B960494DF}">
-                  <a14:hiddenLine xmlns="" xmlns:a14="http://schemas.microsoft.com/office/drawing/2010/main" w="9525">
+                  <a14:hiddenLine xmlns:a14="http://schemas.microsoft.com/office/drawing/2010/main" xmlns="" w="9525">
                     <a:solidFill>
                       <a:srgbClr val="000000"/>
                     </a:solidFill>
@@ -13753,7 +13742,7 @@
               </a:ln>
               <a:extLst>
                 <a:ext uri="{91240B29-F687-4f45-9708-019B960494DF}">
-                  <a14:hiddenLine xmlns="" xmlns:a14="http://schemas.microsoft.com/office/drawing/2010/main" w="9525">
+                  <a14:hiddenLine xmlns:a14="http://schemas.microsoft.com/office/drawing/2010/main" xmlns="" w="9525">
                     <a:solidFill>
                       <a:srgbClr val="000000"/>
                     </a:solidFill>
@@ -13818,7 +13807,7 @@
               </a:ln>
               <a:extLst>
                 <a:ext uri="{91240B29-F687-4f45-9708-019B960494DF}">
-                  <a14:hiddenLine xmlns="" xmlns:a14="http://schemas.microsoft.com/office/drawing/2010/main" w="9525">
+                  <a14:hiddenLine xmlns:a14="http://schemas.microsoft.com/office/drawing/2010/main" xmlns="" w="9525">
                     <a:solidFill>
                       <a:srgbClr val="000000"/>
                     </a:solidFill>
@@ -13908,7 +13897,7 @@
               </a:ln>
               <a:extLst>
                 <a:ext uri="{91240B29-F687-4f45-9708-019B960494DF}">
-                  <a14:hiddenLine xmlns="" xmlns:a14="http://schemas.microsoft.com/office/drawing/2010/main" w="9525">
+                  <a14:hiddenLine xmlns:a14="http://schemas.microsoft.com/office/drawing/2010/main" xmlns="" w="9525">
                     <a:solidFill>
                       <a:srgbClr val="000000"/>
                     </a:solidFill>
@@ -13970,7 +13959,7 @@
               </a:ln>
               <a:extLst>
                 <a:ext uri="{91240B29-F687-4f45-9708-019B960494DF}">
-                  <a14:hiddenLine xmlns="" xmlns:a14="http://schemas.microsoft.com/office/drawing/2010/main" w="9525">
+                  <a14:hiddenLine xmlns:a14="http://schemas.microsoft.com/office/drawing/2010/main" xmlns="" w="9525">
                     <a:solidFill>
                       <a:srgbClr val="000000"/>
                     </a:solidFill>
@@ -14060,7 +14049,7 @@
               </a:ln>
               <a:extLst>
                 <a:ext uri="{91240B29-F687-4f45-9708-019B960494DF}">
-                  <a14:hiddenLine xmlns="" xmlns:a14="http://schemas.microsoft.com/office/drawing/2010/main" w="9525">
+                  <a14:hiddenLine xmlns:a14="http://schemas.microsoft.com/office/drawing/2010/main" xmlns="" w="9525">
                     <a:solidFill>
                       <a:srgbClr val="000000"/>
                     </a:solidFill>
@@ -14125,7 +14114,7 @@
               </a:ln>
               <a:extLst>
                 <a:ext uri="{91240B29-F687-4f45-9708-019B960494DF}">
-                  <a14:hiddenLine xmlns="" xmlns:a14="http://schemas.microsoft.com/office/drawing/2010/main" w="9525">
+                  <a14:hiddenLine xmlns:a14="http://schemas.microsoft.com/office/drawing/2010/main" xmlns="" w="9525">
                     <a:solidFill>
                       <a:srgbClr val="000000"/>
                     </a:solidFill>
@@ -14187,7 +14176,7 @@
               </a:ln>
               <a:extLst>
                 <a:ext uri="{91240B29-F687-4f45-9708-019B960494DF}">
-                  <a14:hiddenLine xmlns="" xmlns:a14="http://schemas.microsoft.com/office/drawing/2010/main" w="9525">
+                  <a14:hiddenLine xmlns:a14="http://schemas.microsoft.com/office/drawing/2010/main" xmlns="" w="9525">
                     <a:solidFill>
                       <a:srgbClr val="000000"/>
                     </a:solidFill>
@@ -14277,7 +14266,7 @@
               </a:ln>
               <a:extLst>
                 <a:ext uri="{91240B29-F687-4f45-9708-019B960494DF}">
-                  <a14:hiddenLine xmlns="" xmlns:a14="http://schemas.microsoft.com/office/drawing/2010/main" w="9525">
+                  <a14:hiddenLine xmlns:a14="http://schemas.microsoft.com/office/drawing/2010/main" xmlns="" w="9525">
                     <a:solidFill>
                       <a:srgbClr val="000000"/>
                     </a:solidFill>
@@ -14367,7 +14356,7 @@
               </a:ln>
               <a:extLst>
                 <a:ext uri="{91240B29-F687-4f45-9708-019B960494DF}">
-                  <a14:hiddenLine xmlns="" xmlns:a14="http://schemas.microsoft.com/office/drawing/2010/main" w="9525">
+                  <a14:hiddenLine xmlns:a14="http://schemas.microsoft.com/office/drawing/2010/main" xmlns="" w="9525">
                     <a:solidFill>
                       <a:srgbClr val="000000"/>
                     </a:solidFill>
@@ -14432,7 +14421,7 @@
               </a:ln>
               <a:extLst>
                 <a:ext uri="{91240B29-F687-4f45-9708-019B960494DF}">
-                  <a14:hiddenLine xmlns="" xmlns:a14="http://schemas.microsoft.com/office/drawing/2010/main" w="9525">
+                  <a14:hiddenLine xmlns:a14="http://schemas.microsoft.com/office/drawing/2010/main" xmlns="" w="9525">
                     <a:solidFill>
                       <a:srgbClr val="000000"/>
                     </a:solidFill>
@@ -14552,7 +14541,7 @@
               </a:ln>
               <a:extLst>
                 <a:ext uri="{91240B29-F687-4f45-9708-019B960494DF}">
-                  <a14:hiddenLine xmlns="" xmlns:a14="http://schemas.microsoft.com/office/drawing/2010/main" w="9525">
+                  <a14:hiddenLine xmlns:a14="http://schemas.microsoft.com/office/drawing/2010/main" xmlns="" w="9525">
                     <a:solidFill>
                       <a:srgbClr val="000000"/>
                     </a:solidFill>
@@ -14633,7 +14622,7 @@
               </a:ln>
               <a:extLst>
                 <a:ext uri="{91240B29-F687-4f45-9708-019B960494DF}">
-                  <a14:hiddenLine xmlns="" xmlns:a14="http://schemas.microsoft.com/office/drawing/2010/main" w="9525">
+                  <a14:hiddenLine xmlns:a14="http://schemas.microsoft.com/office/drawing/2010/main" xmlns="" w="9525">
                     <a:solidFill>
                       <a:srgbClr val="000000"/>
                     </a:solidFill>
@@ -14748,7 +14737,7 @@
               </a:ln>
               <a:extLst>
                 <a:ext uri="{91240B29-F687-4f45-9708-019B960494DF}">
-                  <a14:hiddenLine xmlns="" xmlns:a14="http://schemas.microsoft.com/office/drawing/2010/main" w="9525">
+                  <a14:hiddenLine xmlns:a14="http://schemas.microsoft.com/office/drawing/2010/main" xmlns="" w="9525">
                     <a:solidFill>
                       <a:srgbClr val="000000"/>
                     </a:solidFill>
@@ -14838,7 +14827,7 @@
               </a:ln>
               <a:extLst>
                 <a:ext uri="{91240B29-F687-4f45-9708-019B960494DF}">
-                  <a14:hiddenLine xmlns="" xmlns:a14="http://schemas.microsoft.com/office/drawing/2010/main" w="9525">
+                  <a14:hiddenLine xmlns:a14="http://schemas.microsoft.com/office/drawing/2010/main" xmlns="" w="9525">
                     <a:solidFill>
                       <a:srgbClr val="000000"/>
                     </a:solidFill>
@@ -14903,7 +14892,7 @@
               </a:ln>
               <a:extLst>
                 <a:ext uri="{91240B29-F687-4f45-9708-019B960494DF}">
-                  <a14:hiddenLine xmlns="" xmlns:a14="http://schemas.microsoft.com/office/drawing/2010/main" w="9525">
+                  <a14:hiddenLine xmlns:a14="http://schemas.microsoft.com/office/drawing/2010/main" xmlns="" w="9525">
                     <a:solidFill>
                       <a:srgbClr val="000000"/>
                     </a:solidFill>
@@ -14993,7 +14982,7 @@
               </a:ln>
               <a:extLst>
                 <a:ext uri="{91240B29-F687-4f45-9708-019B960494DF}">
-                  <a14:hiddenLine xmlns="" xmlns:a14="http://schemas.microsoft.com/office/drawing/2010/main" w="9525">
+                  <a14:hiddenLine xmlns:a14="http://schemas.microsoft.com/office/drawing/2010/main" xmlns="" w="9525">
                     <a:solidFill>
                       <a:srgbClr val="000000"/>
                     </a:solidFill>
@@ -15061,7 +15050,7 @@
               </a:ln>
               <a:extLst>
                 <a:ext uri="{91240B29-F687-4f45-9708-019B960494DF}">
-                  <a14:hiddenLine xmlns="" xmlns:a14="http://schemas.microsoft.com/office/drawing/2010/main" w="9525">
+                  <a14:hiddenLine xmlns:a14="http://schemas.microsoft.com/office/drawing/2010/main" xmlns="" w="9525">
                     <a:solidFill>
                       <a:srgbClr val="000000"/>
                     </a:solidFill>
@@ -15151,7 +15140,7 @@
               </a:ln>
               <a:extLst>
                 <a:ext uri="{91240B29-F687-4f45-9708-019B960494DF}">
-                  <a14:hiddenLine xmlns="" xmlns:a14="http://schemas.microsoft.com/office/drawing/2010/main" w="9525">
+                  <a14:hiddenLine xmlns:a14="http://schemas.microsoft.com/office/drawing/2010/main" xmlns="" w="9525">
                     <a:solidFill>
                       <a:srgbClr val="000000"/>
                     </a:solidFill>
@@ -15219,7 +15208,7 @@
               </a:ln>
               <a:extLst>
                 <a:ext uri="{91240B29-F687-4f45-9708-019B960494DF}">
-                  <a14:hiddenLine xmlns="" xmlns:a14="http://schemas.microsoft.com/office/drawing/2010/main" w="9525">
+                  <a14:hiddenLine xmlns:a14="http://schemas.microsoft.com/office/drawing/2010/main" xmlns="" w="9525">
                     <a:solidFill>
                       <a:srgbClr val="000000"/>
                     </a:solidFill>
@@ -15309,7 +15298,7 @@
               </a:ln>
               <a:extLst>
                 <a:ext uri="{91240B29-F687-4f45-9708-019B960494DF}">
-                  <a14:hiddenLine xmlns="" xmlns:a14="http://schemas.microsoft.com/office/drawing/2010/main" w="9525">
+                  <a14:hiddenLine xmlns:a14="http://schemas.microsoft.com/office/drawing/2010/main" xmlns="" w="9525">
                     <a:solidFill>
                       <a:srgbClr val="000000"/>
                     </a:solidFill>
@@ -15343,7 +15332,7 @@
               </a:ln>
               <a:extLst>
                 <a:ext uri="{91240B29-F687-4f45-9708-019B960494DF}">
-                  <a14:hiddenLine xmlns="" xmlns:a14="http://schemas.microsoft.com/office/drawing/2010/main" w="9525">
+                  <a14:hiddenLine xmlns:a14="http://schemas.microsoft.com/office/drawing/2010/main" xmlns="" w="9525">
                     <a:solidFill>
                       <a:srgbClr val="000000"/>
                     </a:solidFill>
@@ -15484,7 +15473,7 @@
             <a:fld id="{48A87A34-81AB-432B-8DAE-1953F412C126}" type="datetimeFigureOut">
               <a:rPr lang="en-US" dirty="0"/>
               <a:pPr/>
-              <a:t>4/7/18</a:t>
+              <a:t>4/9/2018</a:t>
             </a:fld>
             <a:endParaRPr lang="en-US" dirty="0"/>
           </a:p>
@@ -15905,7 +15894,7 @@
           <p:cNvPr id="2" name="Title 1">
             <a:extLst>
               <a:ext uri="{FF2B5EF4-FFF2-40B4-BE49-F238E27FC236}">
-                <a16:creationId xmlns:a16="http://schemas.microsoft.com/office/drawing/2014/main" xmlns="" id="{859C0FDA-FEBB-45BA-A660-7A39790A441A}"/>
+                <a16:creationId xmlns:a16="http://schemas.microsoft.com/office/drawing/2014/main" id="{859C0FDA-FEBB-45BA-A660-7A39790A441A}"/>
               </a:ext>
             </a:extLst>
           </p:cNvPr>
@@ -15934,7 +15923,7 @@
           <p:cNvPr id="3" name="Subtitle 2">
             <a:extLst>
               <a:ext uri="{FF2B5EF4-FFF2-40B4-BE49-F238E27FC236}">
-                <a16:creationId xmlns:a16="http://schemas.microsoft.com/office/drawing/2014/main" xmlns="" id="{9799353A-4180-41EE-960A-8C7960D9B021}"/>
+                <a16:creationId xmlns:a16="http://schemas.microsoft.com/office/drawing/2014/main" id="{9799353A-4180-41EE-960A-8C7960D9B021}"/>
               </a:ext>
             </a:extLst>
           </p:cNvPr>
@@ -16023,7 +16012,7 @@
           <p:cNvPr id="2" name="Title 1">
             <a:extLst>
               <a:ext uri="{FF2B5EF4-FFF2-40B4-BE49-F238E27FC236}">
-                <a16:creationId xmlns:a16="http://schemas.microsoft.com/office/drawing/2014/main" xmlns="" id="{91F89147-F139-42B2-834C-DB8ED5DC240D}"/>
+                <a16:creationId xmlns:a16="http://schemas.microsoft.com/office/drawing/2014/main" id="{745ACAFA-833B-447B-9DAA-58DD1C80F49E}"/>
               </a:ext>
             </a:extLst>
           </p:cNvPr>
@@ -16039,6 +16028,158 @@
           <a:bodyPr/>
           <a:lstStyle/>
           <a:p>
+            <a:r>
+              <a:rPr lang="en-CA" dirty="0"/>
+              <a:t>Shared Memory</a:t>
+            </a:r>
+          </a:p>
+        </p:txBody>
+      </p:sp>
+      <p:sp>
+        <p:nvSpPr>
+          <p:cNvPr id="3" name="Text Placeholder 2">
+            <a:extLst>
+              <a:ext uri="{FF2B5EF4-FFF2-40B4-BE49-F238E27FC236}">
+                <a16:creationId xmlns:a16="http://schemas.microsoft.com/office/drawing/2014/main" id="{FD7BC92A-85D0-4A2E-8808-3EA0EDDC05B7}"/>
+              </a:ext>
+            </a:extLst>
+          </p:cNvPr>
+          <p:cNvSpPr>
+            <a:spLocks noGrp="1"/>
+          </p:cNvSpPr>
+          <p:nvPr>
+            <p:ph type="body" idx="1"/>
+          </p:nvPr>
+        </p:nvSpPr>
+        <p:spPr/>
+        <p:txBody>
+          <a:bodyPr/>
+          <a:lstStyle/>
+          <a:p>
+            <a:r>
+              <a:rPr lang="en-CA" dirty="0"/>
+              <a:t>Problems:</a:t>
+            </a:r>
+          </a:p>
+        </p:txBody>
+      </p:sp>
+      <p:sp>
+        <p:nvSpPr>
+          <p:cNvPr id="4" name="Content Placeholder 3">
+            <a:extLst>
+              <a:ext uri="{FF2B5EF4-FFF2-40B4-BE49-F238E27FC236}">
+                <a16:creationId xmlns:a16="http://schemas.microsoft.com/office/drawing/2014/main" id="{359B3F54-8483-4C7E-A2F6-D66298276031}"/>
+              </a:ext>
+            </a:extLst>
+          </p:cNvPr>
+          <p:cNvSpPr>
+            <a:spLocks noGrp="1"/>
+          </p:cNvSpPr>
+          <p:nvPr>
+            <p:ph sz="half" idx="2"/>
+          </p:nvPr>
+        </p:nvSpPr>
+        <p:spPr/>
+        <p:txBody>
+          <a:bodyPr>
+            <a:normAutofit lnSpcReduction="10000"/>
+          </a:bodyPr>
+          <a:lstStyle/>
+          <a:p>
+            <a:r>
+              <a:rPr lang="en-CA" dirty="0"/>
+              <a:t>Each pixel had to access a different set of pixels to calculate the average</a:t>
+            </a:r>
+          </a:p>
+          <a:p>
+            <a:r>
+              <a:rPr lang="en-CA" dirty="0"/>
+              <a:t>The values stored in share memory may not contain region of image required for averaging pixel  </a:t>
+            </a:r>
+          </a:p>
+        </p:txBody>
+      </p:sp>
+      <p:sp>
+        <p:nvSpPr>
+          <p:cNvPr id="6" name="Content Placeholder 5">
+            <a:extLst>
+              <a:ext uri="{FF2B5EF4-FFF2-40B4-BE49-F238E27FC236}">
+                <a16:creationId xmlns:a16="http://schemas.microsoft.com/office/drawing/2014/main" id="{93B1EB76-F3DA-405F-899C-73C068D495C0}"/>
+              </a:ext>
+            </a:extLst>
+          </p:cNvPr>
+          <p:cNvSpPr>
+            <a:spLocks noGrp="1"/>
+          </p:cNvSpPr>
+          <p:nvPr>
+            <p:ph sz="quarter" idx="4"/>
+          </p:nvPr>
+        </p:nvSpPr>
+        <p:spPr/>
+        <p:txBody>
+          <a:bodyPr>
+            <a:normAutofit lnSpcReduction="10000"/>
+          </a:bodyPr>
+          <a:lstStyle/>
+          <a:p>
+            <a:r>
+              <a:rPr lang="en-CA" dirty="0"/>
+              <a:t>The whole image is too large to put into Shared Memory</a:t>
+            </a:r>
+          </a:p>
+        </p:txBody>
+      </p:sp>
+    </p:spTree>
+    <p:extLst>
+      <p:ext uri="{BB962C8B-B14F-4D97-AF65-F5344CB8AC3E}">
+        <p14:creationId xmlns:p14="http://schemas.microsoft.com/office/powerpoint/2010/main" val="3991125359"/>
+      </p:ext>
+    </p:extLst>
+  </p:cSld>
+  <p:clrMapOvr>
+    <a:masterClrMapping/>
+  </p:clrMapOvr>
+</p:sld>
+</file>
+
+<file path=ppt/slides/slide11.xml><?xml version="1.0" encoding="utf-8"?>
+<p:sld xmlns:a="http://schemas.openxmlformats.org/drawingml/2006/main" xmlns:r="http://schemas.openxmlformats.org/officeDocument/2006/relationships" xmlns:p="http://schemas.openxmlformats.org/presentationml/2006/main">
+  <p:cSld>
+    <p:spTree>
+      <p:nvGrpSpPr>
+        <p:cNvPr id="1" name=""/>
+        <p:cNvGrpSpPr/>
+        <p:nvPr/>
+      </p:nvGrpSpPr>
+      <p:grpSpPr>
+        <a:xfrm>
+          <a:off x="0" y="0"/>
+          <a:ext cx="0" cy="0"/>
+          <a:chOff x="0" y="0"/>
+          <a:chExt cx="0" cy="0"/>
+        </a:xfrm>
+      </p:grpSpPr>
+      <p:sp>
+        <p:nvSpPr>
+          <p:cNvPr id="2" name="Title 1">
+            <a:extLst>
+              <a:ext uri="{FF2B5EF4-FFF2-40B4-BE49-F238E27FC236}">
+                <a16:creationId xmlns:a16="http://schemas.microsoft.com/office/drawing/2014/main" id="{91F89147-F139-42B2-834C-DB8ED5DC240D}"/>
+              </a:ext>
+            </a:extLst>
+          </p:cNvPr>
+          <p:cNvSpPr>
+            <a:spLocks noGrp="1"/>
+          </p:cNvSpPr>
+          <p:nvPr>
+            <p:ph type="title"/>
+          </p:nvPr>
+        </p:nvSpPr>
+        <p:spPr/>
+        <p:txBody>
+          <a:bodyPr/>
+          <a:lstStyle/>
+          <a:p>
             <a:pPr algn="ctr"/>
             <a:r>
               <a:rPr lang="en-CA" dirty="0"/>
@@ -16052,7 +16193,7 @@
           <p:cNvPr id="7" name="Content Placeholder 6">
             <a:extLst>
               <a:ext uri="{FF2B5EF4-FFF2-40B4-BE49-F238E27FC236}">
-                <a16:creationId xmlns:a16="http://schemas.microsoft.com/office/drawing/2014/main" xmlns="" id="{88860C7C-1D3B-4CBF-9BEE-9048C5AC8752}"/>
+                <a16:creationId xmlns:a16="http://schemas.microsoft.com/office/drawing/2014/main" id="{88860C7C-1D3B-4CBF-9BEE-9048C5AC8752}"/>
               </a:ext>
             </a:extLst>
           </p:cNvPr>
@@ -16091,72 +16232,6 @@
 </p:sld>
 </file>
 
-<file path=ppt/slides/slide11.xml><?xml version="1.0" encoding="utf-8"?>
-<p:sld xmlns:a="http://schemas.openxmlformats.org/drawingml/2006/main" xmlns:r="http://schemas.openxmlformats.org/officeDocument/2006/relationships" xmlns:p="http://schemas.openxmlformats.org/presentationml/2006/main">
-  <p:cSld>
-    <p:spTree>
-      <p:nvGrpSpPr>
-        <p:cNvPr id="1" name=""/>
-        <p:cNvGrpSpPr/>
-        <p:nvPr/>
-      </p:nvGrpSpPr>
-      <p:grpSpPr>
-        <a:xfrm>
-          <a:off x="0" y="0"/>
-          <a:ext cx="0" cy="0"/>
-          <a:chOff x="0" y="0"/>
-          <a:chExt cx="0" cy="0"/>
-        </a:xfrm>
-      </p:grpSpPr>
-      <p:sp>
-        <p:nvSpPr>
-          <p:cNvPr id="2" name="Title 1">
-            <a:extLst>
-              <a:ext uri="{FF2B5EF4-FFF2-40B4-BE49-F238E27FC236}">
-                <a16:creationId xmlns:a16="http://schemas.microsoft.com/office/drawing/2014/main" xmlns="" id="{91F89147-F139-42B2-834C-DB8ED5DC240D}"/>
-              </a:ext>
-            </a:extLst>
-          </p:cNvPr>
-          <p:cNvSpPr>
-            <a:spLocks noGrp="1"/>
-          </p:cNvSpPr>
-          <p:nvPr>
-            <p:ph type="title"/>
-          </p:nvPr>
-        </p:nvSpPr>
-        <p:spPr>
-          <a:xfrm>
-            <a:off x="3217068" y="2242834"/>
-            <a:ext cx="5757863" cy="2372332"/>
-          </a:xfrm>
-        </p:spPr>
-        <p:txBody>
-          <a:bodyPr>
-            <a:normAutofit/>
-          </a:bodyPr>
-          <a:lstStyle/>
-          <a:p>
-            <a:pPr algn="ctr"/>
-            <a:r>
-              <a:rPr lang="en-CA" sz="7200" dirty="0"/>
-              <a:t>Q&amp;A</a:t>
-            </a:r>
-          </a:p>
-        </p:txBody>
-      </p:sp>
-    </p:spTree>
-    <p:extLst>
-      <p:ext uri="{BB962C8B-B14F-4D97-AF65-F5344CB8AC3E}">
-        <p14:creationId xmlns:p14="http://schemas.microsoft.com/office/powerpoint/2010/main" val="1918034967"/>
-      </p:ext>
-    </p:extLst>
-  </p:cSld>
-  <p:clrMapOvr>
-    <a:masterClrMapping/>
-  </p:clrMapOvr>
-</p:sld>
-</file>
-
 <file path=ppt/slides/slide12.xml><?xml version="1.0" encoding="utf-8"?>
 <p:sld xmlns:a="http://schemas.openxmlformats.org/drawingml/2006/main" xmlns:r="http://schemas.openxmlformats.org/officeDocument/2006/relationships" xmlns:p="http://schemas.openxmlformats.org/presentationml/2006/main">
   <p:cSld>
@@ -16179,7 +16254,73 @@
           <p:cNvPr id="2" name="Title 1">
             <a:extLst>
               <a:ext uri="{FF2B5EF4-FFF2-40B4-BE49-F238E27FC236}">
-                <a16:creationId xmlns:a16="http://schemas.microsoft.com/office/drawing/2014/main" xmlns="" id="{17B3B087-EC5F-435F-AE01-CE915708D106}"/>
+                <a16:creationId xmlns:a16="http://schemas.microsoft.com/office/drawing/2014/main" id="{91F89147-F139-42B2-834C-DB8ED5DC240D}"/>
+              </a:ext>
+            </a:extLst>
+          </p:cNvPr>
+          <p:cNvSpPr>
+            <a:spLocks noGrp="1"/>
+          </p:cNvSpPr>
+          <p:nvPr>
+            <p:ph type="title"/>
+          </p:nvPr>
+        </p:nvSpPr>
+        <p:spPr>
+          <a:xfrm>
+            <a:off x="3217068" y="2242834"/>
+            <a:ext cx="5757863" cy="2372332"/>
+          </a:xfrm>
+        </p:spPr>
+        <p:txBody>
+          <a:bodyPr>
+            <a:normAutofit/>
+          </a:bodyPr>
+          <a:lstStyle/>
+          <a:p>
+            <a:pPr algn="ctr"/>
+            <a:r>
+              <a:rPr lang="en-CA" sz="7200" dirty="0"/>
+              <a:t>Q&amp;A</a:t>
+            </a:r>
+          </a:p>
+        </p:txBody>
+      </p:sp>
+    </p:spTree>
+    <p:extLst>
+      <p:ext uri="{BB962C8B-B14F-4D97-AF65-F5344CB8AC3E}">
+        <p14:creationId xmlns:p14="http://schemas.microsoft.com/office/powerpoint/2010/main" val="1918034967"/>
+      </p:ext>
+    </p:extLst>
+  </p:cSld>
+  <p:clrMapOvr>
+    <a:masterClrMapping/>
+  </p:clrMapOvr>
+</p:sld>
+</file>
+
+<file path=ppt/slides/slide13.xml><?xml version="1.0" encoding="utf-8"?>
+<p:sld xmlns:a="http://schemas.openxmlformats.org/drawingml/2006/main" xmlns:r="http://schemas.openxmlformats.org/officeDocument/2006/relationships" xmlns:p="http://schemas.openxmlformats.org/presentationml/2006/main">
+  <p:cSld>
+    <p:spTree>
+      <p:nvGrpSpPr>
+        <p:cNvPr id="1" name=""/>
+        <p:cNvGrpSpPr/>
+        <p:nvPr/>
+      </p:nvGrpSpPr>
+      <p:grpSpPr>
+        <a:xfrm>
+          <a:off x="0" y="0"/>
+          <a:ext cx="0" cy="0"/>
+          <a:chOff x="0" y="0"/>
+          <a:chExt cx="0" cy="0"/>
+        </a:xfrm>
+      </p:grpSpPr>
+      <p:sp>
+        <p:nvSpPr>
+          <p:cNvPr id="2" name="Title 1">
+            <a:extLst>
+              <a:ext uri="{FF2B5EF4-FFF2-40B4-BE49-F238E27FC236}">
+                <a16:creationId xmlns:a16="http://schemas.microsoft.com/office/drawing/2014/main" id="{17B3B087-EC5F-435F-AE01-CE915708D106}"/>
               </a:ext>
             </a:extLst>
           </p:cNvPr>
@@ -16212,7 +16353,7 @@
           <p:cNvPr id="3" name="Content Placeholder 2">
             <a:extLst>
               <a:ext uri="{FF2B5EF4-FFF2-40B4-BE49-F238E27FC236}">
-                <a16:creationId xmlns:a16="http://schemas.microsoft.com/office/drawing/2014/main" xmlns="" id="{7D1CA314-D345-49DF-951C-E33BF1FFF41D}"/>
+                <a16:creationId xmlns:a16="http://schemas.microsoft.com/office/drawing/2014/main" id="{7D1CA314-D345-49DF-951C-E33BF1FFF41D}"/>
               </a:ext>
             </a:extLst>
           </p:cNvPr>
@@ -16336,7 +16477,7 @@
           <p:cNvPr id="2" name="Title 1">
             <a:extLst>
               <a:ext uri="{FF2B5EF4-FFF2-40B4-BE49-F238E27FC236}">
-                <a16:creationId xmlns:a16="http://schemas.microsoft.com/office/drawing/2014/main" xmlns="" id="{17B3B087-EC5F-435F-AE01-CE915708D106}"/>
+                <a16:creationId xmlns:a16="http://schemas.microsoft.com/office/drawing/2014/main" id="{17B3B087-EC5F-435F-AE01-CE915708D106}"/>
               </a:ext>
             </a:extLst>
           </p:cNvPr>
@@ -16369,7 +16510,7 @@
           <p:cNvPr id="3" name="Content Placeholder 2">
             <a:extLst>
               <a:ext uri="{FF2B5EF4-FFF2-40B4-BE49-F238E27FC236}">
-                <a16:creationId xmlns:a16="http://schemas.microsoft.com/office/drawing/2014/main" xmlns="" id="{7D1CA314-D345-49DF-951C-E33BF1FFF41D}"/>
+                <a16:creationId xmlns:a16="http://schemas.microsoft.com/office/drawing/2014/main" id="{7D1CA314-D345-49DF-951C-E33BF1FFF41D}"/>
               </a:ext>
             </a:extLst>
           </p:cNvPr>
@@ -16491,7 +16632,7 @@
           <p:cNvPr id="2" name="Title 1">
             <a:extLst>
               <a:ext uri="{FF2B5EF4-FFF2-40B4-BE49-F238E27FC236}">
-                <a16:creationId xmlns:a16="http://schemas.microsoft.com/office/drawing/2014/main" xmlns="" id="{91F89147-F139-42B2-834C-DB8ED5DC240D}"/>
+                <a16:creationId xmlns:a16="http://schemas.microsoft.com/office/drawing/2014/main" id="{91F89147-F139-42B2-834C-DB8ED5DC240D}"/>
               </a:ext>
             </a:extLst>
           </p:cNvPr>
@@ -16520,7 +16661,7 @@
           <p:cNvPr id="3" name="Content Placeholder 2">
             <a:extLst>
               <a:ext uri="{FF2B5EF4-FFF2-40B4-BE49-F238E27FC236}">
-                <a16:creationId xmlns:a16="http://schemas.microsoft.com/office/drawing/2014/main" xmlns="" id="{4876307B-8D8B-4308-AC98-25C93E30857A}"/>
+                <a16:creationId xmlns:a16="http://schemas.microsoft.com/office/drawing/2014/main" id="{4876307B-8D8B-4308-AC98-25C93E30857A}"/>
               </a:ext>
             </a:extLst>
           </p:cNvPr>
@@ -16573,7 +16714,7 @@
           <p:cNvPr id="7" name="Chart 6">
             <a:extLst>
               <a:ext uri="{FF2B5EF4-FFF2-40B4-BE49-F238E27FC236}">
-                <a16:creationId xmlns:a16="http://schemas.microsoft.com/office/drawing/2014/main" xmlns="" id="{0F654679-6AFF-418D-B424-B948A7312A0D}"/>
+                <a16:creationId xmlns:a16="http://schemas.microsoft.com/office/drawing/2014/main" id="{0F654679-6AFF-418D-B424-B948A7312A0D}"/>
               </a:ext>
             </a:extLst>
           </p:cNvPr>
@@ -16625,7 +16766,7 @@
           <p:cNvPr id="2" name="Title 1">
             <a:extLst>
               <a:ext uri="{FF2B5EF4-FFF2-40B4-BE49-F238E27FC236}">
-                <a16:creationId xmlns:a16="http://schemas.microsoft.com/office/drawing/2014/main" xmlns="" id="{91F89147-F139-42B2-834C-DB8ED5DC240D}"/>
+                <a16:creationId xmlns:a16="http://schemas.microsoft.com/office/drawing/2014/main" id="{91F89147-F139-42B2-834C-DB8ED5DC240D}"/>
               </a:ext>
             </a:extLst>
           </p:cNvPr>
@@ -16654,7 +16795,7 @@
           <p:cNvPr id="3" name="Content Placeholder 2">
             <a:extLst>
               <a:ext uri="{FF2B5EF4-FFF2-40B4-BE49-F238E27FC236}">
-                <a16:creationId xmlns:a16="http://schemas.microsoft.com/office/drawing/2014/main" xmlns="" id="{4876307B-8D8B-4308-AC98-25C93E30857A}"/>
+                <a16:creationId xmlns:a16="http://schemas.microsoft.com/office/drawing/2014/main" id="{4876307B-8D8B-4308-AC98-25C93E30857A}"/>
               </a:ext>
             </a:extLst>
           </p:cNvPr>
@@ -16688,7 +16829,7 @@
           <p:cNvPr id="5" name="Picture 4">
             <a:extLst>
               <a:ext uri="{FF2B5EF4-FFF2-40B4-BE49-F238E27FC236}">
-                <a16:creationId xmlns:a16="http://schemas.microsoft.com/office/drawing/2014/main" xmlns="" id="{635CB8C6-2A18-4680-90E9-2A057BE3057A}"/>
+                <a16:creationId xmlns:a16="http://schemas.microsoft.com/office/drawing/2014/main" id="{635CB8C6-2A18-4680-90E9-2A057BE3057A}"/>
               </a:ext>
             </a:extLst>
           </p:cNvPr>
@@ -16718,7 +16859,7 @@
           <p:cNvPr id="7" name="Picture 6">
             <a:extLst>
               <a:ext uri="{FF2B5EF4-FFF2-40B4-BE49-F238E27FC236}">
-                <a16:creationId xmlns:a16="http://schemas.microsoft.com/office/drawing/2014/main" xmlns="" id="{B757423A-3E76-4708-B465-F696D519C980}"/>
+                <a16:creationId xmlns:a16="http://schemas.microsoft.com/office/drawing/2014/main" id="{B757423A-3E76-4708-B465-F696D519C980}"/>
               </a:ext>
             </a:extLst>
           </p:cNvPr>
@@ -16778,7 +16919,7 @@
           <p:cNvPr id="2" name="Title 1">
             <a:extLst>
               <a:ext uri="{FF2B5EF4-FFF2-40B4-BE49-F238E27FC236}">
-                <a16:creationId xmlns:a16="http://schemas.microsoft.com/office/drawing/2014/main" xmlns="" id="{91F89147-F139-42B2-834C-DB8ED5DC240D}"/>
+                <a16:creationId xmlns:a16="http://schemas.microsoft.com/office/drawing/2014/main" id="{91F89147-F139-42B2-834C-DB8ED5DC240D}"/>
               </a:ext>
             </a:extLst>
           </p:cNvPr>
@@ -16807,7 +16948,7 @@
           <p:cNvPr id="3" name="Content Placeholder 2">
             <a:extLst>
               <a:ext uri="{FF2B5EF4-FFF2-40B4-BE49-F238E27FC236}">
-                <a16:creationId xmlns:a16="http://schemas.microsoft.com/office/drawing/2014/main" xmlns="" id="{4876307B-8D8B-4308-AC98-25C93E30857A}"/>
+                <a16:creationId xmlns:a16="http://schemas.microsoft.com/office/drawing/2014/main" id="{4876307B-8D8B-4308-AC98-25C93E30857A}"/>
               </a:ext>
             </a:extLst>
           </p:cNvPr>
@@ -16877,7 +17018,7 @@
           <p:cNvPr id="2" name="Title 1">
             <a:extLst>
               <a:ext uri="{FF2B5EF4-FFF2-40B4-BE49-F238E27FC236}">
-                <a16:creationId xmlns:a16="http://schemas.microsoft.com/office/drawing/2014/main" xmlns="" id="{91F89147-F139-42B2-834C-DB8ED5DC240D}"/>
+                <a16:creationId xmlns:a16="http://schemas.microsoft.com/office/drawing/2014/main" id="{91F89147-F139-42B2-834C-DB8ED5DC240D}"/>
               </a:ext>
             </a:extLst>
           </p:cNvPr>
@@ -16906,7 +17047,7 @@
           <p:cNvPr id="3" name="Content Placeholder 2">
             <a:extLst>
               <a:ext uri="{FF2B5EF4-FFF2-40B4-BE49-F238E27FC236}">
-                <a16:creationId xmlns:a16="http://schemas.microsoft.com/office/drawing/2014/main" xmlns="" id="{4876307B-8D8B-4308-AC98-25C93E30857A}"/>
+                <a16:creationId xmlns:a16="http://schemas.microsoft.com/office/drawing/2014/main" id="{4876307B-8D8B-4308-AC98-25C93E30857A}"/>
               </a:ext>
             </a:extLst>
           </p:cNvPr>
@@ -16940,7 +17081,7 @@
           <p:cNvPr id="5" name="Picture 4">
             <a:extLst>
               <a:ext uri="{FF2B5EF4-FFF2-40B4-BE49-F238E27FC236}">
-                <a16:creationId xmlns:a16="http://schemas.microsoft.com/office/drawing/2014/main" xmlns="" id="{8457D56C-13D2-41AE-8A8E-8DE52A0CD2F6}"/>
+                <a16:creationId xmlns:a16="http://schemas.microsoft.com/office/drawing/2014/main" id="{8457D56C-13D2-41AE-8A8E-8DE52A0CD2F6}"/>
               </a:ext>
             </a:extLst>
           </p:cNvPr>
@@ -17000,7 +17141,7 @@
           <p:cNvPr id="2" name="Title 1">
             <a:extLst>
               <a:ext uri="{FF2B5EF4-FFF2-40B4-BE49-F238E27FC236}">
-                <a16:creationId xmlns:a16="http://schemas.microsoft.com/office/drawing/2014/main" xmlns="" id="{91F89147-F139-42B2-834C-DB8ED5DC240D}"/>
+                <a16:creationId xmlns:a16="http://schemas.microsoft.com/office/drawing/2014/main" id="{91F89147-F139-42B2-834C-DB8ED5DC240D}"/>
               </a:ext>
             </a:extLst>
           </p:cNvPr>
@@ -17029,7 +17170,7 @@
           <p:cNvPr id="3" name="Content Placeholder 2">
             <a:extLst>
               <a:ext uri="{FF2B5EF4-FFF2-40B4-BE49-F238E27FC236}">
-                <a16:creationId xmlns:a16="http://schemas.microsoft.com/office/drawing/2014/main" xmlns="" id="{4876307B-8D8B-4308-AC98-25C93E30857A}"/>
+                <a16:creationId xmlns:a16="http://schemas.microsoft.com/office/drawing/2014/main" id="{4876307B-8D8B-4308-AC98-25C93E30857A}"/>
               </a:ext>
             </a:extLst>
           </p:cNvPr>
@@ -17087,7 +17228,7 @@
           <p:cNvPr id="6" name="Content Placeholder 5">
             <a:extLst>
               <a:ext uri="{FF2B5EF4-FFF2-40B4-BE49-F238E27FC236}">
-                <a16:creationId xmlns:a16="http://schemas.microsoft.com/office/drawing/2014/main" xmlns="" id="{90165589-7D69-4B1F-8991-5ECBC2A1C9BE}"/>
+                <a16:creationId xmlns:a16="http://schemas.microsoft.com/office/drawing/2014/main" id="{90165589-7D69-4B1F-8991-5ECBC2A1C9BE}"/>
               </a:ext>
             </a:extLst>
           </p:cNvPr>
@@ -17171,7 +17312,7 @@
           <p:cNvPr id="2" name="Title 1">
             <a:extLst>
               <a:ext uri="{FF2B5EF4-FFF2-40B4-BE49-F238E27FC236}">
-                <a16:creationId xmlns:a16="http://schemas.microsoft.com/office/drawing/2014/main" xmlns="" id="{91F89147-F139-42B2-834C-DB8ED5DC240D}"/>
+                <a16:creationId xmlns:a16="http://schemas.microsoft.com/office/drawing/2014/main" id="{91F89147-F139-42B2-834C-DB8ED5DC240D}"/>
               </a:ext>
             </a:extLst>
           </p:cNvPr>
@@ -17200,7 +17341,7 @@
           <p:cNvPr id="7" name="Content Placeholder 6">
             <a:extLst>
               <a:ext uri="{FF2B5EF4-FFF2-40B4-BE49-F238E27FC236}">
-                <a16:creationId xmlns:a16="http://schemas.microsoft.com/office/drawing/2014/main" xmlns="" id="{88860C7C-1D3B-4CBF-9BEE-9048C5AC8752}"/>
+                <a16:creationId xmlns:a16="http://schemas.microsoft.com/office/drawing/2014/main" id="{88860C7C-1D3B-4CBF-9BEE-9048C5AC8752}"/>
               </a:ext>
             </a:extLst>
           </p:cNvPr>
@@ -17261,7 +17402,7 @@
           <p:cNvPr id="2" name="Title 1">
             <a:extLst>
               <a:ext uri="{FF2B5EF4-FFF2-40B4-BE49-F238E27FC236}">
-                <a16:creationId xmlns:a16="http://schemas.microsoft.com/office/drawing/2014/main" xmlns="" id="{91F89147-F139-42B2-834C-DB8ED5DC240D}"/>
+                <a16:creationId xmlns:a16="http://schemas.microsoft.com/office/drawing/2014/main" id="{91F89147-F139-42B2-834C-DB8ED5DC240D}"/>
               </a:ext>
             </a:extLst>
           </p:cNvPr>
@@ -17290,7 +17431,7 @@
           <p:cNvPr id="3" name="Content Placeholder 2">
             <a:extLst>
               <a:ext uri="{FF2B5EF4-FFF2-40B4-BE49-F238E27FC236}">
-                <a16:creationId xmlns:a16="http://schemas.microsoft.com/office/drawing/2014/main" xmlns="" id="{4876307B-8D8B-4308-AC98-25C93E30857A}"/>
+                <a16:creationId xmlns:a16="http://schemas.microsoft.com/office/drawing/2014/main" id="{4876307B-8D8B-4308-AC98-25C93E30857A}"/>
               </a:ext>
             </a:extLst>
           </p:cNvPr>
@@ -17351,19 +17492,7 @@
             <a:pPr lvl="1"/>
             <a:r>
               <a:rPr lang="en-CA" dirty="0"/>
-              <a:t>Calculate the number of Threads per Block </a:t>
-            </a:r>
-            <a:r>
-              <a:rPr lang="en-CA"/>
-              <a:t>based </a:t>
-            </a:r>
-            <a:r>
-              <a:rPr lang="en-CA" smtClean="0"/>
-              <a:t>on resident </a:t>
-            </a:r>
-            <a:r>
-              <a:rPr lang="en-CA" dirty="0"/>
-              <a:t>threads and blocks</a:t>
+              <a:t>Calculate the number of Threads per Block based on resident threads and blocks</a:t>
             </a:r>
           </a:p>
           <a:p>
@@ -17373,14 +17502,29 @@
               <a:t>Calculate the number of Blocks based on the image and threads per Block</a:t>
             </a:r>
           </a:p>
+          <a:p>
+            <a:pPr lvl="1"/>
+            <a:r>
+              <a:rPr lang="en-CA" dirty="0"/>
+              <a:t>Use </a:t>
+            </a:r>
+            <a:r>
+              <a:rPr lang="en-CA" dirty="0" err="1"/>
+              <a:t>Cuda’s</a:t>
+            </a:r>
+            <a:r>
+              <a:rPr lang="en-CA" dirty="0"/>
+              <a:t> Occupancy Calculator</a:t>
+            </a:r>
+          </a:p>
         </p:txBody>
       </p:sp>
       <p:pic>
         <p:nvPicPr>
-          <p:cNvPr id="8" name="Picture 7">
+          <p:cNvPr id="4" name="Picture 3">
             <a:extLst>
               <a:ext uri="{FF2B5EF4-FFF2-40B4-BE49-F238E27FC236}">
-                <a16:creationId xmlns:a16="http://schemas.microsoft.com/office/drawing/2014/main" xmlns="" id="{C88DD98C-309C-4EF7-849E-4A2A966D6CB1}"/>
+                <a16:creationId xmlns:a16="http://schemas.microsoft.com/office/drawing/2014/main" id="{296E850B-F192-47D2-A8B4-D6AA542A9981}"/>
               </a:ext>
             </a:extLst>
           </p:cNvPr>
@@ -17389,15 +17533,16 @@
           </p:cNvPicPr>
           <p:nvPr/>
         </p:nvPicPr>
-        <p:blipFill rotWithShape="1">
+        <p:blipFill>
           <a:blip r:embed="rId2"/>
-          <a:srcRect l="13" r="62634"/>
-          <a:stretch/>
+          <a:stretch>
+            <a:fillRect/>
+          </a:stretch>
         </p:blipFill>
         <p:spPr>
           <a:xfrm>
-            <a:off x="1692741" y="2702859"/>
-            <a:ext cx="4554071" cy="569075"/>
+            <a:off x="1786658" y="2789993"/>
+            <a:ext cx="8816877" cy="580223"/>
           </a:xfrm>
           <a:prstGeom prst="rect">
             <a:avLst/>

</xml_diff>